<commit_message>
Changes to bring ontology and paper into sync
</commit_message>
<xml_diff>
--- a/documentation/images/diagrams.pptx
+++ b/documentation/images/diagrams.pptx
@@ -8,6 +8,9 @@
     <p:sldId id="257" r:id="rId2"/>
     <p:sldId id="261" r:id="rId3"/>
     <p:sldId id="262" r:id="rId4"/>
+    <p:sldId id="263" r:id="rId5"/>
+    <p:sldId id="264" r:id="rId6"/>
+    <p:sldId id="265" r:id="rId7"/>
   </p:sldIdLst>
   <p:sldSz cx="9144000" cy="6858000" type="screen4x3"/>
   <p:notesSz cx="7315200" cy="9601200"/>
@@ -291,7 +294,7 @@
             <a:fld id="{9222C97E-73C8-43E8-A42B-6C809C4F9F15}" type="datetimeFigureOut">
               <a:rPr lang="en-US" smtClean="0"/>
               <a:pPr/>
-              <a:t>7/5/2010</a:t>
+              <a:t>10/20/2010</a:t>
             </a:fld>
             <a:endParaRPr lang="en-CA"/>
           </a:p>
@@ -458,7 +461,7 @@
             <a:fld id="{9222C97E-73C8-43E8-A42B-6C809C4F9F15}" type="datetimeFigureOut">
               <a:rPr lang="en-US" smtClean="0"/>
               <a:pPr/>
-              <a:t>7/5/2010</a:t>
+              <a:t>10/20/2010</a:t>
             </a:fld>
             <a:endParaRPr lang="en-CA"/>
           </a:p>
@@ -635,7 +638,7 @@
             <a:fld id="{9222C97E-73C8-43E8-A42B-6C809C4F9F15}" type="datetimeFigureOut">
               <a:rPr lang="en-US" smtClean="0"/>
               <a:pPr/>
-              <a:t>7/5/2010</a:t>
+              <a:t>10/20/2010</a:t>
             </a:fld>
             <a:endParaRPr lang="en-CA"/>
           </a:p>
@@ -802,7 +805,7 @@
             <a:fld id="{9222C97E-73C8-43E8-A42B-6C809C4F9F15}" type="datetimeFigureOut">
               <a:rPr lang="en-US" smtClean="0"/>
               <a:pPr/>
-              <a:t>7/5/2010</a:t>
+              <a:t>10/20/2010</a:t>
             </a:fld>
             <a:endParaRPr lang="en-CA"/>
           </a:p>
@@ -1045,7 +1048,7 @@
             <a:fld id="{9222C97E-73C8-43E8-A42B-6C809C4F9F15}" type="datetimeFigureOut">
               <a:rPr lang="en-US" smtClean="0"/>
               <a:pPr/>
-              <a:t>7/5/2010</a:t>
+              <a:t>10/20/2010</a:t>
             </a:fld>
             <a:endParaRPr lang="en-CA"/>
           </a:p>
@@ -1330,7 +1333,7 @@
             <a:fld id="{9222C97E-73C8-43E8-A42B-6C809C4F9F15}" type="datetimeFigureOut">
               <a:rPr lang="en-US" smtClean="0"/>
               <a:pPr/>
-              <a:t>7/5/2010</a:t>
+              <a:t>10/20/2010</a:t>
             </a:fld>
             <a:endParaRPr lang="en-CA"/>
           </a:p>
@@ -1749,7 +1752,7 @@
             <a:fld id="{9222C97E-73C8-43E8-A42B-6C809C4F9F15}" type="datetimeFigureOut">
               <a:rPr lang="en-US" smtClean="0"/>
               <a:pPr/>
-              <a:t>7/5/2010</a:t>
+              <a:t>10/20/2010</a:t>
             </a:fld>
             <a:endParaRPr lang="en-CA"/>
           </a:p>
@@ -1864,7 +1867,7 @@
             <a:fld id="{9222C97E-73C8-43E8-A42B-6C809C4F9F15}" type="datetimeFigureOut">
               <a:rPr lang="en-US" smtClean="0"/>
               <a:pPr/>
-              <a:t>7/5/2010</a:t>
+              <a:t>10/20/2010</a:t>
             </a:fld>
             <a:endParaRPr lang="en-CA"/>
           </a:p>
@@ -1956,7 +1959,7 @@
             <a:fld id="{9222C97E-73C8-43E8-A42B-6C809C4F9F15}" type="datetimeFigureOut">
               <a:rPr lang="en-US" smtClean="0"/>
               <a:pPr/>
-              <a:t>7/5/2010</a:t>
+              <a:t>10/20/2010</a:t>
             </a:fld>
             <a:endParaRPr lang="en-CA"/>
           </a:p>
@@ -2230,7 +2233,7 @@
             <a:fld id="{9222C97E-73C8-43E8-A42B-6C809C4F9F15}" type="datetimeFigureOut">
               <a:rPr lang="en-US" smtClean="0"/>
               <a:pPr/>
-              <a:t>7/5/2010</a:t>
+              <a:t>10/20/2010</a:t>
             </a:fld>
             <a:endParaRPr lang="en-CA"/>
           </a:p>
@@ -2480,7 +2483,7 @@
             <a:fld id="{9222C97E-73C8-43E8-A42B-6C809C4F9F15}" type="datetimeFigureOut">
               <a:rPr lang="en-US" smtClean="0"/>
               <a:pPr/>
-              <a:t>7/5/2010</a:t>
+              <a:t>10/20/2010</a:t>
             </a:fld>
             <a:endParaRPr lang="en-CA"/>
           </a:p>
@@ -2690,7 +2693,7 @@
             <a:fld id="{9222C97E-73C8-43E8-A42B-6C809C4F9F15}" type="datetimeFigureOut">
               <a:rPr lang="en-US" smtClean="0"/>
               <a:pPr/>
-              <a:t>7/5/2010</a:t>
+              <a:t>10/20/2010</a:t>
             </a:fld>
             <a:endParaRPr lang="en-CA"/>
           </a:p>
@@ -3069,7 +3072,7 @@
         </p:nvSpPr>
         <p:spPr>
           <a:xfrm>
-            <a:off x="1460680" y="1152128"/>
+            <a:off x="4067944" y="1340768"/>
             <a:ext cx="1139992" cy="646331"/>
           </a:xfrm>
           <a:prstGeom prst="rect">
@@ -3106,7 +3109,7 @@
         </p:nvSpPr>
         <p:spPr>
           <a:xfrm>
-            <a:off x="2023228" y="3189838"/>
+            <a:off x="4630492" y="3378478"/>
             <a:ext cx="1001108" cy="338554"/>
           </a:xfrm>
           <a:prstGeom prst="rect">
@@ -3144,7 +3147,7 @@
         </p:nvSpPr>
         <p:spPr>
           <a:xfrm>
-            <a:off x="1512168" y="3744416"/>
+            <a:off x="4119432" y="3933056"/>
             <a:ext cx="1016304" cy="646331"/>
           </a:xfrm>
           <a:prstGeom prst="rect">
@@ -3182,7 +3185,7 @@
         </p:nvSpPr>
         <p:spPr>
           <a:xfrm>
-            <a:off x="2030673" y="1893694"/>
+            <a:off x="4637937" y="2082334"/>
             <a:ext cx="1425711" cy="338554"/>
           </a:xfrm>
           <a:prstGeom prst="rect">
@@ -3220,7 +3223,7 @@
         </p:nvSpPr>
         <p:spPr>
           <a:xfrm>
-            <a:off x="1440160" y="2448272"/>
+            <a:off x="4047424" y="2636912"/>
             <a:ext cx="1081899" cy="646331"/>
           </a:xfrm>
           <a:prstGeom prst="rect">
@@ -3262,7 +3265,7 @@
         </p:nvSpPr>
         <p:spPr>
           <a:xfrm>
-            <a:off x="0" y="2088232"/>
+            <a:off x="2607264" y="2276872"/>
             <a:ext cx="1250086" cy="338554"/>
           </a:xfrm>
           <a:prstGeom prst="rect">
@@ -3300,8 +3303,8 @@
         </p:nvSpPr>
         <p:spPr>
           <a:xfrm>
-            <a:off x="2016224" y="729200"/>
-            <a:ext cx="1345818" cy="338554"/>
+            <a:off x="5110058" y="1362254"/>
+            <a:ext cx="1190134" cy="338554"/>
           </a:xfrm>
           <a:prstGeom prst="rect">
             <a:avLst/>
@@ -3320,7 +3323,7 @@
                   <a:schemeClr val="tx2"/>
                 </a:solidFill>
               </a:rPr>
-              <a:t>is specified by</a:t>
+              <a:t>conforms to</a:t>
             </a:r>
             <a:endParaRPr lang="en-CA" sz="1600" dirty="0">
               <a:solidFill>
@@ -3338,7 +3341,7 @@
         </p:nvSpPr>
         <p:spPr>
           <a:xfrm>
-            <a:off x="1022997" y="0"/>
+            <a:off x="6300192" y="1340768"/>
             <a:ext cx="2053960" cy="646331"/>
           </a:xfrm>
           <a:prstGeom prst="rect">
@@ -3379,7 +3382,7 @@
         </p:nvCxnSpPr>
         <p:spPr>
           <a:xfrm rot="10800000">
-            <a:off x="1460680" y="1475294"/>
+            <a:off x="4067944" y="1663934"/>
             <a:ext cx="51488" cy="2592288"/>
           </a:xfrm>
           <a:prstGeom prst="bentConnector3">
@@ -3409,13 +3412,16 @@
       <p:cxnSp>
         <p:nvCxnSpPr>
           <p:cNvPr id="67" name="Straight Arrow Connector 66"/>
-          <p:cNvCxnSpPr/>
+          <p:cNvCxnSpPr>
+            <a:stCxn id="2" idx="3"/>
+            <a:endCxn id="31" idx="1"/>
+          </p:cNvCxnSpPr>
           <p:nvPr/>
         </p:nvCxnSpPr>
         <p:spPr>
-          <a:xfrm rot="16200000" flipV="1">
-            <a:off x="1800993" y="863303"/>
-            <a:ext cx="432050" cy="1588"/>
+          <a:xfrm>
+            <a:off x="5207936" y="1663934"/>
+            <a:ext cx="1092256" cy="1588"/>
           </a:xfrm>
           <a:prstGeom prst="straightConnector1">
             <a:avLst/>
@@ -3447,7 +3453,7 @@
         </p:nvCxnSpPr>
         <p:spPr>
           <a:xfrm rot="5400000">
-            <a:off x="1728986" y="2087438"/>
+            <a:off x="4336250" y="2276078"/>
             <a:ext cx="576064" cy="1588"/>
           </a:xfrm>
           <a:prstGeom prst="straightConnector1">
@@ -3480,7 +3486,7 @@
         </p:nvCxnSpPr>
         <p:spPr>
           <a:xfrm rot="5400000">
-            <a:off x="1727398" y="3383582"/>
+            <a:off x="4334662" y="3572222"/>
             <a:ext cx="576064" cy="1588"/>
           </a:xfrm>
           <a:prstGeom prst="straightConnector1">
@@ -3505,6 +3511,108 @@
           </a:fontRef>
         </p:style>
       </p:cxnSp>
+      <p:sp>
+        <p:nvSpPr>
+          <p:cNvPr id="15" name="TextBox 14"/>
+          <p:cNvSpPr txBox="1"/>
+          <p:nvPr/>
+        </p:nvSpPr>
+        <p:spPr>
+          <a:xfrm>
+            <a:off x="4140353" y="476672"/>
+            <a:ext cx="1079719" cy="369332"/>
+          </a:xfrm>
+          <a:prstGeom prst="rect">
+            <a:avLst/>
+          </a:prstGeom>
+          <a:noFill/>
+        </p:spPr>
+        <p:txBody>
+          <a:bodyPr wrap="none" rtlCol="0">
+            <a:spAutoFit/>
+          </a:bodyPr>
+          <a:lstStyle/>
+          <a:p>
+            <a:pPr algn="ctr"/>
+            <a:r>
+              <a:rPr lang="en-CA" dirty="0" smtClean="0"/>
+              <a:t>data item</a:t>
+            </a:r>
+            <a:endParaRPr lang="en-CA" dirty="0"/>
+          </a:p>
+        </p:txBody>
+      </p:sp>
+      <p:cxnSp>
+        <p:nvCxnSpPr>
+          <p:cNvPr id="17" name="Straight Arrow Connector 16"/>
+          <p:cNvCxnSpPr/>
+          <p:nvPr/>
+        </p:nvCxnSpPr>
+        <p:spPr>
+          <a:xfrm rot="16200000" flipV="1">
+            <a:off x="4392774" y="1087946"/>
+            <a:ext cx="504056" cy="1588"/>
+          </a:xfrm>
+          <a:prstGeom prst="straightConnector1">
+            <a:avLst/>
+          </a:prstGeom>
+          <a:ln>
+            <a:tailEnd type="arrow"/>
+          </a:ln>
+        </p:spPr>
+        <p:style>
+          <a:lnRef idx="1">
+            <a:schemeClr val="accent1"/>
+          </a:lnRef>
+          <a:fillRef idx="0">
+            <a:schemeClr val="accent1"/>
+          </a:fillRef>
+          <a:effectRef idx="0">
+            <a:schemeClr val="accent1"/>
+          </a:effectRef>
+          <a:fontRef idx="minor">
+            <a:schemeClr val="tx1"/>
+          </a:fontRef>
+        </p:style>
+      </p:cxnSp>
+      <p:sp>
+        <p:nvSpPr>
+          <p:cNvPr id="22" name="TextBox 21"/>
+          <p:cNvSpPr txBox="1"/>
+          <p:nvPr/>
+        </p:nvSpPr>
+        <p:spPr>
+          <a:xfrm>
+            <a:off x="4620482" y="908720"/>
+            <a:ext cx="455574" cy="338554"/>
+          </a:xfrm>
+          <a:prstGeom prst="rect">
+            <a:avLst/>
+          </a:prstGeom>
+          <a:noFill/>
+        </p:spPr>
+        <p:txBody>
+          <a:bodyPr wrap="none" rtlCol="0">
+            <a:spAutoFit/>
+          </a:bodyPr>
+          <a:lstStyle/>
+          <a:p>
+            <a:r>
+              <a:rPr lang="en-CA" sz="1600" dirty="0" smtClean="0">
+                <a:solidFill>
+                  <a:schemeClr val="tx2"/>
+                </a:solidFill>
+              </a:rPr>
+              <a:t>is a</a:t>
+            </a:r>
+            <a:endParaRPr lang="en-CA" sz="1600" dirty="0">
+              <a:solidFill>
+                <a:schemeClr val="tx2"/>
+              </a:solidFill>
+            </a:endParaRPr>
+          </a:p>
+        </p:txBody>
+      </p:sp>
     </p:spTree>
   </p:cSld>
   <p:clrMapOvr>
@@ -3618,15 +3726,7 @@
                   <a:schemeClr val="tx2"/>
                 </a:solidFill>
               </a:rPr>
-              <a:t>is </a:t>
-            </a:r>
-            <a:r>
-              <a:rPr lang="en-CA" sz="1600" dirty="0" smtClean="0">
-                <a:solidFill>
-                  <a:schemeClr val="tx2"/>
-                </a:solidFill>
-              </a:rPr>
-              <a:t>specified</a:t>
+              <a:t>is specified</a:t>
             </a:r>
           </a:p>
           <a:p>
@@ -4256,11 +4356,6 @@
               </a:rPr>
               <a:t>has input</a:t>
             </a:r>
-            <a:endParaRPr lang="en-CA" sz="1600" i="1" dirty="0" smtClean="0">
-              <a:solidFill>
-                <a:schemeClr val="tx2"/>
-              </a:solidFill>
-            </a:endParaRPr>
           </a:p>
         </p:txBody>
       </p:sp>
@@ -4330,7 +4425,7 @@
         </p:nvSpPr>
         <p:spPr>
           <a:xfrm>
-            <a:off x="833944" y="0"/>
+            <a:off x="3518256" y="3068960"/>
             <a:ext cx="1856086" cy="584775"/>
           </a:xfrm>
           <a:prstGeom prst="rect">
@@ -4367,8 +4462,8 @@
         </p:nvSpPr>
         <p:spPr>
           <a:xfrm>
-            <a:off x="1140074" y="1533654"/>
-            <a:ext cx="1062022" cy="338554"/>
+            <a:off x="1835696" y="1988840"/>
+            <a:ext cx="1062022" cy="584775"/>
           </a:xfrm>
           <a:prstGeom prst="rect">
             <a:avLst/>
@@ -4381,10 +4476,18 @@
           </a:bodyPr>
           <a:lstStyle/>
           <a:p>
+            <a:pPr algn="ctr"/>
             <a:r>
               <a:rPr lang="en-CA" sz="1600" dirty="0" smtClean="0"/>
               <a:t>parameter</a:t>
             </a:r>
+            <a:br>
+              <a:rPr lang="en-CA" sz="1600" dirty="0" smtClean="0"/>
+            </a:br>
+            <a:r>
+              <a:rPr lang="en-CA" sz="1600" dirty="0" smtClean="0"/>
+              <a:t>data item</a:t>
+            </a:r>
             <a:endParaRPr lang="en-CA" sz="1600" dirty="0"/>
           </a:p>
         </p:txBody>
@@ -4397,7 +4500,7 @@
         </p:nvSpPr>
         <p:spPr>
           <a:xfrm>
-            <a:off x="401896" y="648072"/>
+            <a:off x="2987824" y="1934416"/>
             <a:ext cx="570990" cy="523220"/>
           </a:xfrm>
           <a:prstGeom prst="rect">
@@ -4439,16 +4542,166 @@
           </a:p>
         </p:txBody>
       </p:sp>
-      <p:sp>
-        <p:nvSpPr>
-          <p:cNvPr id="5" name="TextBox 4"/>
+      <p:cxnSp>
+        <p:nvCxnSpPr>
+          <p:cNvPr id="12" name="Straight Arrow Connector 11"/>
+          <p:cNvCxnSpPr/>
+          <p:nvPr/>
+        </p:nvCxnSpPr>
+        <p:spPr>
+          <a:xfrm rot="10800000">
+            <a:off x="2843808" y="2204864"/>
+            <a:ext cx="792088" cy="1588"/>
+          </a:xfrm>
+          <a:prstGeom prst="straightConnector1">
+            <a:avLst/>
+          </a:prstGeom>
+          <a:ln>
+            <a:tailEnd type="arrow"/>
+          </a:ln>
+        </p:spPr>
+        <p:style>
+          <a:lnRef idx="1">
+            <a:schemeClr val="accent1"/>
+          </a:lnRef>
+          <a:fillRef idx="0">
+            <a:schemeClr val="accent1"/>
+          </a:fillRef>
+          <a:effectRef idx="0">
+            <a:schemeClr val="accent1"/>
+          </a:effectRef>
+          <a:fontRef idx="minor">
+            <a:schemeClr val="tx1"/>
+          </a:fontRef>
+        </p:style>
+      </p:cxnSp>
+      <p:sp>
+        <p:nvSpPr>
+          <p:cNvPr id="13" name="TextBox 12"/>
           <p:cNvSpPr txBox="1"/>
           <p:nvPr/>
         </p:nvSpPr>
         <p:spPr>
           <a:xfrm>
-            <a:off x="2470024" y="700916"/>
-            <a:ext cx="684803" cy="523220"/>
+            <a:off x="3563888" y="1988840"/>
+            <a:ext cx="1777410" cy="584775"/>
+          </a:xfrm>
+          <a:prstGeom prst="rect">
+            <a:avLst/>
+          </a:prstGeom>
+          <a:noFill/>
+        </p:spPr>
+        <p:txBody>
+          <a:bodyPr wrap="none" rtlCol="0">
+            <a:spAutoFit/>
+          </a:bodyPr>
+          <a:lstStyle/>
+          <a:p>
+            <a:pPr algn="ctr"/>
+            <a:r>
+              <a:rPr lang="en-CA" sz="1600" dirty="0" smtClean="0"/>
+              <a:t>parameterized </a:t>
+            </a:r>
+            <a:r>
+              <a:rPr lang="en-CA" sz="1600" dirty="0" smtClean="0"/>
+              <a:t/>
+            </a:r>
+            <a:br>
+              <a:rPr lang="en-CA" sz="1600" dirty="0" smtClean="0"/>
+            </a:br>
+            <a:r>
+              <a:rPr lang="en-CA" sz="1600" dirty="0" smtClean="0"/>
+              <a:t>software execution</a:t>
+            </a:r>
+            <a:endParaRPr lang="en-CA" sz="1600" dirty="0"/>
+          </a:p>
+        </p:txBody>
+      </p:sp>
+      <p:cxnSp>
+        <p:nvCxnSpPr>
+          <p:cNvPr id="14" name="Straight Arrow Connector 13"/>
+          <p:cNvCxnSpPr>
+            <a:stCxn id="2" idx="0"/>
+            <a:endCxn id="13" idx="2"/>
+          </p:cNvCxnSpPr>
+          <p:nvPr/>
+        </p:nvCxnSpPr>
+        <p:spPr>
+          <a:xfrm rot="5400000" flipH="1" flipV="1">
+            <a:off x="4201774" y="2818141"/>
+            <a:ext cx="495345" cy="6294"/>
+          </a:xfrm>
+          <a:prstGeom prst="straightConnector1">
+            <a:avLst/>
+          </a:prstGeom>
+          <a:ln>
+            <a:tailEnd type="arrow"/>
+          </a:ln>
+        </p:spPr>
+        <p:style>
+          <a:lnRef idx="1">
+            <a:schemeClr val="accent1"/>
+          </a:lnRef>
+          <a:fillRef idx="0">
+            <a:schemeClr val="accent1"/>
+          </a:fillRef>
+          <a:effectRef idx="0">
+            <a:schemeClr val="accent1"/>
+          </a:effectRef>
+          <a:fontRef idx="minor">
+            <a:schemeClr val="tx1"/>
+          </a:fontRef>
+        </p:style>
+      </p:cxnSp>
+      <p:sp>
+        <p:nvSpPr>
+          <p:cNvPr id="19" name="TextBox 18"/>
+          <p:cNvSpPr txBox="1"/>
+          <p:nvPr/>
+        </p:nvSpPr>
+        <p:spPr>
+          <a:xfrm>
+            <a:off x="4382352" y="2689175"/>
+            <a:ext cx="423514" cy="307777"/>
+          </a:xfrm>
+          <a:prstGeom prst="rect">
+            <a:avLst/>
+          </a:prstGeom>
+          <a:noFill/>
+        </p:spPr>
+        <p:txBody>
+          <a:bodyPr wrap="none" rtlCol="0">
+            <a:spAutoFit/>
+          </a:bodyPr>
+          <a:lstStyle/>
+          <a:p>
+            <a:pPr algn="ctr"/>
+            <a:r>
+              <a:rPr lang="en-CA" sz="1400" dirty="0" smtClean="0">
+                <a:solidFill>
+                  <a:schemeClr val="tx2"/>
+                </a:solidFill>
+              </a:rPr>
+              <a:t>is a</a:t>
+            </a:r>
+            <a:endParaRPr lang="en-CA" sz="1400" dirty="0">
+              <a:solidFill>
+                <a:schemeClr val="tx2"/>
+              </a:solidFill>
+            </a:endParaRPr>
+          </a:p>
+        </p:txBody>
+      </p:sp>
+      <p:sp>
+        <p:nvSpPr>
+          <p:cNvPr id="22" name="TextBox 21"/>
+          <p:cNvSpPr txBox="1"/>
+          <p:nvPr/>
+        </p:nvSpPr>
+        <p:spPr>
+          <a:xfrm>
+            <a:off x="5220072" y="1916832"/>
+            <a:ext cx="684804" cy="523220"/>
           </a:xfrm>
           <a:prstGeom prst="rect">
             <a:avLst/>
@@ -4489,102 +4742,16 @@
           </a:p>
         </p:txBody>
       </p:sp>
-      <p:sp>
-        <p:nvSpPr>
-          <p:cNvPr id="9" name="TextBox 8"/>
-          <p:cNvSpPr txBox="1"/>
-          <p:nvPr/>
-        </p:nvSpPr>
-        <p:spPr>
-          <a:xfrm>
-            <a:off x="2418120" y="1440160"/>
-            <a:ext cx="1034579" cy="338554"/>
-          </a:xfrm>
-          <a:prstGeom prst="rect">
-            <a:avLst/>
-          </a:prstGeom>
-          <a:noFill/>
-        </p:spPr>
-        <p:txBody>
-          <a:bodyPr wrap="none" rtlCol="0">
-            <a:spAutoFit/>
-          </a:bodyPr>
-          <a:lstStyle/>
-          <a:p>
-            <a:r>
-              <a:rPr lang="en-CA" sz="1600" dirty="0" smtClean="0">
-                <a:solidFill>
-                  <a:schemeClr val="accent2">
-                    <a:lumMod val="75000"/>
-                  </a:schemeClr>
-                </a:solidFill>
-              </a:rPr>
-              <a:t>descriptor</a:t>
-            </a:r>
-            <a:endParaRPr lang="en-CA" sz="1600" dirty="0">
-              <a:solidFill>
-                <a:schemeClr val="accent2">
-                  <a:lumMod val="75000"/>
-                </a:schemeClr>
-              </a:solidFill>
-            </a:endParaRPr>
-          </a:p>
-        </p:txBody>
-      </p:sp>
-      <p:sp>
-        <p:nvSpPr>
-          <p:cNvPr id="11" name="TextBox 10"/>
-          <p:cNvSpPr txBox="1"/>
-          <p:nvPr/>
-        </p:nvSpPr>
-        <p:spPr>
-          <a:xfrm>
-            <a:off x="0" y="1440160"/>
-            <a:ext cx="977960" cy="338554"/>
-          </a:xfrm>
-          <a:prstGeom prst="rect">
-            <a:avLst/>
-          </a:prstGeom>
-          <a:noFill/>
-        </p:spPr>
-        <p:txBody>
-          <a:bodyPr wrap="none" rtlCol="0">
-            <a:spAutoFit/>
-          </a:bodyPr>
-          <a:lstStyle/>
-          <a:p>
-            <a:r>
-              <a:rPr lang="en-CA" sz="1600" dirty="0" smtClean="0">
-                <a:solidFill>
-                  <a:schemeClr val="tx1">
-                    <a:lumMod val="50000"/>
-                    <a:lumOff val="50000"/>
-                  </a:schemeClr>
-                </a:solidFill>
-              </a:rPr>
-              <a:t>data item</a:t>
-            </a:r>
-            <a:endParaRPr lang="en-CA" sz="1600" dirty="0">
-              <a:solidFill>
-                <a:schemeClr val="tx1">
-                  <a:lumMod val="50000"/>
-                  <a:lumOff val="50000"/>
-                </a:schemeClr>
-              </a:solidFill>
-            </a:endParaRPr>
-          </a:p>
-        </p:txBody>
-      </p:sp>
       <p:cxnSp>
         <p:nvCxnSpPr>
-          <p:cNvPr id="12" name="Straight Arrow Connector 11"/>
+          <p:cNvPr id="23" name="Straight Arrow Connector 22"/>
           <p:cNvCxnSpPr/>
           <p:nvPr/>
         </p:nvCxnSpPr>
         <p:spPr>
-          <a:xfrm rot="10800000" flipV="1">
-            <a:off x="545912" y="576064"/>
-            <a:ext cx="1080120" cy="864096"/>
+          <a:xfrm>
+            <a:off x="5220072" y="2187280"/>
+            <a:ext cx="792088" cy="1588"/>
           </a:xfrm>
           <a:prstGeom prst="straightConnector1">
             <a:avLst/>
@@ -4610,14 +4777,107 @@
       </p:cxnSp>
       <p:sp>
         <p:nvSpPr>
-          <p:cNvPr id="17" name="TextBox 16"/>
+          <p:cNvPr id="24" name="TextBox 23"/>
           <p:cNvSpPr txBox="1"/>
           <p:nvPr/>
         </p:nvSpPr>
         <p:spPr>
           <a:xfrm>
-            <a:off x="1193984" y="792088"/>
-            <a:ext cx="953979" cy="523220"/>
+            <a:off x="6012160" y="2025680"/>
+            <a:ext cx="977960" cy="338554"/>
+          </a:xfrm>
+          <a:prstGeom prst="rect">
+            <a:avLst/>
+          </a:prstGeom>
+          <a:noFill/>
+        </p:spPr>
+        <p:txBody>
+          <a:bodyPr wrap="none" rtlCol="0">
+            <a:spAutoFit/>
+          </a:bodyPr>
+          <a:lstStyle/>
+          <a:p>
+            <a:pPr algn="ctr"/>
+            <a:r>
+              <a:rPr lang="en-CA" sz="1600" dirty="0" smtClean="0"/>
+              <a:t>data item</a:t>
+            </a:r>
+            <a:endParaRPr lang="en-CA" sz="1600" dirty="0"/>
+          </a:p>
+        </p:txBody>
+      </p:sp>
+      <p:sp>
+        <p:nvSpPr>
+          <p:cNvPr id="28" name="Rectangle 27"/>
+          <p:cNvSpPr/>
+          <p:nvPr/>
+        </p:nvSpPr>
+        <p:spPr>
+          <a:xfrm>
+            <a:off x="3635896" y="1196752"/>
+            <a:ext cx="1777410" cy="338554"/>
+          </a:xfrm>
+          <a:prstGeom prst="rect">
+            <a:avLst/>
+          </a:prstGeom>
+        </p:spPr>
+        <p:txBody>
+          <a:bodyPr wrap="none">
+            <a:spAutoFit/>
+          </a:bodyPr>
+          <a:lstStyle/>
+          <a:p>
+            <a:r>
+              <a:rPr lang="en-CA" sz="1600" dirty="0" smtClean="0"/>
+              <a:t>software execution</a:t>
+            </a:r>
+            <a:endParaRPr lang="en-GB" sz="1600" dirty="0"/>
+          </a:p>
+        </p:txBody>
+      </p:sp>
+      <p:cxnSp>
+        <p:nvCxnSpPr>
+          <p:cNvPr id="29" name="Straight Arrow Connector 28"/>
+          <p:cNvCxnSpPr/>
+          <p:nvPr/>
+        </p:nvCxnSpPr>
+        <p:spPr>
+          <a:xfrm rot="5400000" flipH="1" flipV="1">
+            <a:off x="4175398" y="1757766"/>
+            <a:ext cx="495345" cy="6294"/>
+          </a:xfrm>
+          <a:prstGeom prst="straightConnector1">
+            <a:avLst/>
+          </a:prstGeom>
+          <a:ln>
+            <a:tailEnd type="arrow"/>
+          </a:ln>
+        </p:spPr>
+        <p:style>
+          <a:lnRef idx="1">
+            <a:schemeClr val="accent1"/>
+          </a:lnRef>
+          <a:fillRef idx="0">
+            <a:schemeClr val="accent1"/>
+          </a:fillRef>
+          <a:effectRef idx="0">
+            <a:schemeClr val="accent1"/>
+          </a:effectRef>
+          <a:fontRef idx="minor">
+            <a:schemeClr val="tx1"/>
+          </a:fontRef>
+        </p:style>
+      </p:cxnSp>
+      <p:sp>
+        <p:nvSpPr>
+          <p:cNvPr id="30" name="TextBox 29"/>
+          <p:cNvSpPr txBox="1"/>
+          <p:nvPr/>
+        </p:nvSpPr>
+        <p:spPr>
+          <a:xfrm>
+            <a:off x="4355976" y="1628800"/>
+            <a:ext cx="423514" cy="307777"/>
           </a:xfrm>
           <a:prstGeom prst="rect">
             <a:avLst/>
@@ -4637,22 +4897,79 @@
                   <a:schemeClr val="tx2"/>
                 </a:solidFill>
               </a:rPr>
-              <a:t>has input</a:t>
-            </a:r>
-            <a:br>
+              <a:t>is a</a:t>
+            </a:r>
+            <a:endParaRPr lang="en-CA" sz="1400" dirty="0">
+              <a:solidFill>
+                <a:schemeClr val="tx2"/>
+              </a:solidFill>
+            </a:endParaRPr>
+          </a:p>
+        </p:txBody>
+      </p:sp>
+      <p:cxnSp>
+        <p:nvCxnSpPr>
+          <p:cNvPr id="31" name="Straight Arrow Connector 30"/>
+          <p:cNvCxnSpPr/>
+          <p:nvPr/>
+        </p:nvCxnSpPr>
+        <p:spPr>
+          <a:xfrm rot="5400000" flipH="1" flipV="1">
+            <a:off x="4175398" y="965678"/>
+            <a:ext cx="495345" cy="6294"/>
+          </a:xfrm>
+          <a:prstGeom prst="straightConnector1">
+            <a:avLst/>
+          </a:prstGeom>
+          <a:ln>
+            <a:tailEnd type="arrow"/>
+          </a:ln>
+        </p:spPr>
+        <p:style>
+          <a:lnRef idx="1">
+            <a:schemeClr val="accent1"/>
+          </a:lnRef>
+          <a:fillRef idx="0">
+            <a:schemeClr val="accent1"/>
+          </a:fillRef>
+          <a:effectRef idx="0">
+            <a:schemeClr val="accent1"/>
+          </a:effectRef>
+          <a:fontRef idx="minor">
+            <a:schemeClr val="tx1"/>
+          </a:fontRef>
+        </p:style>
+      </p:cxnSp>
+      <p:sp>
+        <p:nvSpPr>
+          <p:cNvPr id="32" name="TextBox 31"/>
+          <p:cNvSpPr txBox="1"/>
+          <p:nvPr/>
+        </p:nvSpPr>
+        <p:spPr>
+          <a:xfrm>
+            <a:off x="4355976" y="836712"/>
+            <a:ext cx="423514" cy="307777"/>
+          </a:xfrm>
+          <a:prstGeom prst="rect">
+            <a:avLst/>
+          </a:prstGeom>
+          <a:noFill/>
+        </p:spPr>
+        <p:txBody>
+          <a:bodyPr wrap="none" rtlCol="0">
+            <a:spAutoFit/>
+          </a:bodyPr>
+          <a:lstStyle/>
+          <a:p>
+            <a:pPr algn="ctr"/>
+            <a:r>
               <a:rPr lang="en-CA" sz="1400" dirty="0" smtClean="0">
                 <a:solidFill>
                   <a:schemeClr val="tx2"/>
                 </a:solidFill>
               </a:rPr>
-            </a:br>
-            <a:r>
-              <a:rPr lang="en-CA" sz="1400" dirty="0" smtClean="0">
-                <a:solidFill>
-                  <a:schemeClr val="tx2"/>
-                </a:solidFill>
-              </a:rPr>
-              <a:t>parameter</a:t>
+              <a:t>is a</a:t>
             </a:r>
             <a:endParaRPr lang="en-CA" sz="1400" dirty="0">
               <a:solidFill>
@@ -4662,18 +4979,240 @@
           </a:p>
         </p:txBody>
       </p:sp>
+      <p:sp>
+        <p:nvSpPr>
+          <p:cNvPr id="33" name="Rectangle 32"/>
+          <p:cNvSpPr/>
+          <p:nvPr/>
+        </p:nvSpPr>
+        <p:spPr>
+          <a:xfrm>
+            <a:off x="4040705" y="404664"/>
+            <a:ext cx="819327" cy="338554"/>
+          </a:xfrm>
+          <a:prstGeom prst="rect">
+            <a:avLst/>
+          </a:prstGeom>
+        </p:spPr>
+        <p:txBody>
+          <a:bodyPr wrap="none">
+            <a:spAutoFit/>
+          </a:bodyPr>
+          <a:lstStyle/>
+          <a:p>
+            <a:r>
+              <a:rPr lang="en-CA" sz="1600" dirty="0" smtClean="0"/>
+              <a:t>process</a:t>
+            </a:r>
+            <a:endParaRPr lang="en-GB" sz="1600" dirty="0"/>
+          </a:p>
+        </p:txBody>
+      </p:sp>
+    </p:spTree>
+  </p:cSld>
+  <p:clrMapOvr>
+    <a:masterClrMapping/>
+  </p:clrMapOvr>
+</p:sld>
+</file>
+
+<file path=ppt/slides/slide4.xml><?xml version="1.0" encoding="utf-8"?>
+<p:sld xmlns:a="http://schemas.openxmlformats.org/drawingml/2006/main" xmlns:r="http://schemas.openxmlformats.org/officeDocument/2006/relationships" xmlns:p="http://schemas.openxmlformats.org/presentationml/2006/main">
+  <p:cSld>
+    <p:spTree>
+      <p:nvGrpSpPr>
+        <p:cNvPr id="1" name=""/>
+        <p:cNvGrpSpPr/>
+        <p:nvPr/>
+      </p:nvGrpSpPr>
+      <p:grpSpPr>
+        <a:xfrm>
+          <a:off x="0" y="0"/>
+          <a:ext cx="0" cy="0"/>
+          <a:chOff x="0" y="0"/>
+          <a:chExt cx="0" cy="0"/>
+        </a:xfrm>
+      </p:grpSpPr>
+      <p:sp>
+        <p:nvSpPr>
+          <p:cNvPr id="2" name="TextBox 1"/>
+          <p:cNvSpPr txBox="1"/>
+          <p:nvPr/>
+        </p:nvSpPr>
+        <p:spPr>
+          <a:xfrm>
+            <a:off x="4860032" y="1412776"/>
+            <a:ext cx="1906869" cy="369332"/>
+          </a:xfrm>
+          <a:prstGeom prst="rect">
+            <a:avLst/>
+          </a:prstGeom>
+          <a:noFill/>
+        </p:spPr>
+        <p:txBody>
+          <a:bodyPr wrap="none" rtlCol="0">
+            <a:spAutoFit/>
+          </a:bodyPr>
+          <a:lstStyle/>
+          <a:p>
+            <a:r>
+              <a:rPr lang="en-CA" dirty="0" smtClean="0"/>
+              <a:t>numeric data item</a:t>
+            </a:r>
+            <a:endParaRPr lang="en-CA" dirty="0"/>
+          </a:p>
+        </p:txBody>
+      </p:sp>
+      <p:sp>
+        <p:nvSpPr>
+          <p:cNvPr id="5" name="TextBox 4"/>
+          <p:cNvSpPr txBox="1"/>
+          <p:nvPr/>
+        </p:nvSpPr>
+        <p:spPr>
+          <a:xfrm>
+            <a:off x="5666569" y="1866310"/>
+            <a:ext cx="1190134" cy="338554"/>
+          </a:xfrm>
+          <a:prstGeom prst="rect">
+            <a:avLst/>
+          </a:prstGeom>
+          <a:noFill/>
+        </p:spPr>
+        <p:txBody>
+          <a:bodyPr wrap="none" rtlCol="0">
+            <a:spAutoFit/>
+          </a:bodyPr>
+          <a:lstStyle/>
+          <a:p>
+            <a:r>
+              <a:rPr lang="en-CA" sz="1600" dirty="0" smtClean="0">
+                <a:solidFill>
+                  <a:schemeClr val="tx2"/>
+                </a:solidFill>
+              </a:rPr>
+              <a:t>conforms to</a:t>
+            </a:r>
+            <a:endParaRPr lang="en-CA" sz="1600" dirty="0">
+              <a:solidFill>
+                <a:schemeClr val="tx2"/>
+              </a:solidFill>
+            </a:endParaRPr>
+          </a:p>
+        </p:txBody>
+      </p:sp>
+      <p:sp>
+        <p:nvSpPr>
+          <p:cNvPr id="6" name="TextBox 5"/>
+          <p:cNvSpPr txBox="1"/>
+          <p:nvPr/>
+        </p:nvSpPr>
+        <p:spPr>
+          <a:xfrm>
+            <a:off x="3942482" y="2420888"/>
+            <a:ext cx="3349058" cy="369332"/>
+          </a:xfrm>
+          <a:prstGeom prst="rect">
+            <a:avLst/>
+          </a:prstGeom>
+          <a:noFill/>
+        </p:spPr>
+        <p:txBody>
+          <a:bodyPr wrap="none" rtlCol="0">
+            <a:spAutoFit/>
+          </a:bodyPr>
+          <a:lstStyle/>
+          <a:p>
+            <a:pPr algn="ctr"/>
+            <a:r>
+              <a:rPr lang="en-CA" dirty="0" smtClean="0"/>
+              <a:t>numeric data format specification</a:t>
+            </a:r>
+            <a:endParaRPr lang="en-CA" dirty="0"/>
+          </a:p>
+        </p:txBody>
+      </p:sp>
+      <p:sp>
+        <p:nvSpPr>
+          <p:cNvPr id="8" name="TextBox 7"/>
+          <p:cNvSpPr txBox="1"/>
+          <p:nvPr/>
+        </p:nvSpPr>
+        <p:spPr>
+          <a:xfrm>
+            <a:off x="4860032" y="908720"/>
+            <a:ext cx="455574" cy="338554"/>
+          </a:xfrm>
+          <a:prstGeom prst="rect">
+            <a:avLst/>
+          </a:prstGeom>
+          <a:noFill/>
+        </p:spPr>
+        <p:txBody>
+          <a:bodyPr wrap="none" rtlCol="0">
+            <a:spAutoFit/>
+          </a:bodyPr>
+          <a:lstStyle/>
+          <a:p>
+            <a:r>
+              <a:rPr lang="en-CA" sz="1600" dirty="0" smtClean="0">
+                <a:solidFill>
+                  <a:schemeClr val="tx2"/>
+                </a:solidFill>
+              </a:rPr>
+              <a:t>is a</a:t>
+            </a:r>
+            <a:endParaRPr lang="en-CA" sz="1600" dirty="0">
+              <a:solidFill>
+                <a:schemeClr val="tx2"/>
+              </a:solidFill>
+            </a:endParaRPr>
+          </a:p>
+        </p:txBody>
+      </p:sp>
+      <p:sp>
+        <p:nvSpPr>
+          <p:cNvPr id="9" name="TextBox 8"/>
+          <p:cNvSpPr txBox="1"/>
+          <p:nvPr/>
+        </p:nvSpPr>
+        <p:spPr>
+          <a:xfrm>
+            <a:off x="3491880" y="548680"/>
+            <a:ext cx="1079719" cy="369332"/>
+          </a:xfrm>
+          <a:prstGeom prst="rect">
+            <a:avLst/>
+          </a:prstGeom>
+          <a:noFill/>
+        </p:spPr>
+        <p:txBody>
+          <a:bodyPr wrap="none" rtlCol="0">
+            <a:spAutoFit/>
+          </a:bodyPr>
+          <a:lstStyle/>
+          <a:p>
+            <a:pPr algn="ctr"/>
+            <a:r>
+              <a:rPr lang="en-CA" dirty="0" smtClean="0"/>
+              <a:t>data item</a:t>
+            </a:r>
+            <a:endParaRPr lang="en-CA" dirty="0"/>
+          </a:p>
+        </p:txBody>
+      </p:sp>
       <p:cxnSp>
         <p:nvCxnSpPr>
-          <p:cNvPr id="21" name="Straight Arrow Connector 20"/>
+          <p:cNvPr id="11" name="Straight Arrow Connector 10"/>
           <p:cNvCxnSpPr>
-            <a:stCxn id="2" idx="2"/>
+            <a:endCxn id="9" idx="2"/>
           </p:cNvCxnSpPr>
           <p:nvPr/>
         </p:nvCxnSpPr>
         <p:spPr>
-          <a:xfrm rot="16200000" flipH="1">
-            <a:off x="1338325" y="1008436"/>
-            <a:ext cx="855385" cy="8061"/>
+          <a:xfrm rot="10800000">
+            <a:off x="4031740" y="918012"/>
+            <a:ext cx="1621968" cy="485646"/>
           </a:xfrm>
           <a:prstGeom prst="straightConnector1">
             <a:avLst/>
@@ -4699,14 +5238,14 @@
       </p:cxnSp>
       <p:cxnSp>
         <p:nvCxnSpPr>
-          <p:cNvPr id="26" name="Straight Arrow Connector 25"/>
+          <p:cNvPr id="12" name="Straight Arrow Connector 11"/>
           <p:cNvCxnSpPr/>
           <p:nvPr/>
         </p:nvCxnSpPr>
         <p:spPr>
-          <a:xfrm>
-            <a:off x="1842056" y="576064"/>
-            <a:ext cx="936104" cy="864096"/>
+          <a:xfrm rot="5400000">
+            <a:off x="5364882" y="2060054"/>
+            <a:ext cx="576064" cy="1588"/>
           </a:xfrm>
           <a:prstGeom prst="straightConnector1">
             <a:avLst/>
@@ -4730,6 +5269,1640 @@
           </a:fontRef>
         </p:style>
       </p:cxnSp>
+      <p:sp>
+        <p:nvSpPr>
+          <p:cNvPr id="15" name="TextBox 14"/>
+          <p:cNvSpPr txBox="1"/>
+          <p:nvPr/>
+        </p:nvSpPr>
+        <p:spPr>
+          <a:xfrm>
+            <a:off x="5076056" y="2852936"/>
+            <a:ext cx="455574" cy="338554"/>
+          </a:xfrm>
+          <a:prstGeom prst="rect">
+            <a:avLst/>
+          </a:prstGeom>
+          <a:noFill/>
+        </p:spPr>
+        <p:txBody>
+          <a:bodyPr wrap="none" rtlCol="0">
+            <a:spAutoFit/>
+          </a:bodyPr>
+          <a:lstStyle/>
+          <a:p>
+            <a:r>
+              <a:rPr lang="en-CA" sz="1600" dirty="0" smtClean="0">
+                <a:solidFill>
+                  <a:schemeClr val="tx2"/>
+                </a:solidFill>
+              </a:rPr>
+              <a:t>is a</a:t>
+            </a:r>
+            <a:endParaRPr lang="en-CA" sz="1600" dirty="0">
+              <a:solidFill>
+                <a:schemeClr val="tx2"/>
+              </a:solidFill>
+            </a:endParaRPr>
+          </a:p>
+        </p:txBody>
+      </p:sp>
+      <p:sp>
+        <p:nvSpPr>
+          <p:cNvPr id="16" name="TextBox 15"/>
+          <p:cNvSpPr txBox="1"/>
+          <p:nvPr/>
+        </p:nvSpPr>
+        <p:spPr>
+          <a:xfrm>
+            <a:off x="2771800" y="3284984"/>
+            <a:ext cx="2521909" cy="369332"/>
+          </a:xfrm>
+          <a:prstGeom prst="rect">
+            <a:avLst/>
+          </a:prstGeom>
+          <a:noFill/>
+        </p:spPr>
+        <p:txBody>
+          <a:bodyPr wrap="none" rtlCol="0">
+            <a:spAutoFit/>
+          </a:bodyPr>
+          <a:lstStyle/>
+          <a:p>
+            <a:pPr algn="ctr"/>
+            <a:r>
+              <a:rPr lang="en-CA" dirty="0" smtClean="0"/>
+              <a:t>data format specification</a:t>
+            </a:r>
+            <a:endParaRPr lang="en-CA" dirty="0"/>
+          </a:p>
+        </p:txBody>
+      </p:sp>
+      <p:cxnSp>
+        <p:nvCxnSpPr>
+          <p:cNvPr id="17" name="Straight Arrow Connector 16"/>
+          <p:cNvCxnSpPr>
+            <a:stCxn id="16" idx="0"/>
+          </p:cNvCxnSpPr>
+          <p:nvPr/>
+        </p:nvCxnSpPr>
+        <p:spPr>
+          <a:xfrm rot="5400000" flipH="1" flipV="1">
+            <a:off x="4586664" y="2217899"/>
+            <a:ext cx="513176" cy="1620994"/>
+          </a:xfrm>
+          <a:prstGeom prst="straightConnector1">
+            <a:avLst/>
+          </a:prstGeom>
+          <a:ln>
+            <a:tailEnd type="arrow"/>
+          </a:ln>
+        </p:spPr>
+        <p:style>
+          <a:lnRef idx="1">
+            <a:schemeClr val="accent1"/>
+          </a:lnRef>
+          <a:fillRef idx="0">
+            <a:schemeClr val="accent1"/>
+          </a:fillRef>
+          <a:effectRef idx="0">
+            <a:schemeClr val="accent1"/>
+          </a:effectRef>
+          <a:fontRef idx="minor">
+            <a:schemeClr val="tx1"/>
+          </a:fontRef>
+        </p:style>
+      </p:cxnSp>
+      <p:sp>
+        <p:nvSpPr>
+          <p:cNvPr id="18" name="TextBox 17"/>
+          <p:cNvSpPr txBox="1"/>
+          <p:nvPr/>
+        </p:nvSpPr>
+        <p:spPr>
+          <a:xfrm>
+            <a:off x="1529110" y="1412776"/>
+            <a:ext cx="1781385" cy="369332"/>
+          </a:xfrm>
+          <a:prstGeom prst="rect">
+            <a:avLst/>
+          </a:prstGeom>
+          <a:noFill/>
+        </p:spPr>
+        <p:txBody>
+          <a:bodyPr wrap="none" rtlCol="0">
+            <a:spAutoFit/>
+          </a:bodyPr>
+          <a:lstStyle/>
+          <a:p>
+            <a:r>
+              <a:rPr lang="en-CA" dirty="0" smtClean="0"/>
+              <a:t>textual data item</a:t>
+            </a:r>
+            <a:endParaRPr lang="en-CA" dirty="0"/>
+          </a:p>
+        </p:txBody>
+      </p:sp>
+      <p:sp>
+        <p:nvSpPr>
+          <p:cNvPr id="19" name="TextBox 18"/>
+          <p:cNvSpPr txBox="1"/>
+          <p:nvPr/>
+        </p:nvSpPr>
+        <p:spPr>
+          <a:xfrm>
+            <a:off x="2335647" y="1866310"/>
+            <a:ext cx="1190134" cy="338554"/>
+          </a:xfrm>
+          <a:prstGeom prst="rect">
+            <a:avLst/>
+          </a:prstGeom>
+          <a:noFill/>
+        </p:spPr>
+        <p:txBody>
+          <a:bodyPr wrap="none" rtlCol="0">
+            <a:spAutoFit/>
+          </a:bodyPr>
+          <a:lstStyle/>
+          <a:p>
+            <a:r>
+              <a:rPr lang="en-CA" sz="1600" dirty="0" smtClean="0">
+                <a:solidFill>
+                  <a:schemeClr val="tx2"/>
+                </a:solidFill>
+              </a:rPr>
+              <a:t>conforms to</a:t>
+            </a:r>
+            <a:endParaRPr lang="en-CA" sz="1600" dirty="0">
+              <a:solidFill>
+                <a:schemeClr val="tx2"/>
+              </a:solidFill>
+            </a:endParaRPr>
+          </a:p>
+        </p:txBody>
+      </p:sp>
+      <p:sp>
+        <p:nvSpPr>
+          <p:cNvPr id="20" name="TextBox 19"/>
+          <p:cNvSpPr txBox="1"/>
+          <p:nvPr/>
+        </p:nvSpPr>
+        <p:spPr>
+          <a:xfrm>
+            <a:off x="674303" y="2420888"/>
+            <a:ext cx="3223575" cy="369332"/>
+          </a:xfrm>
+          <a:prstGeom prst="rect">
+            <a:avLst/>
+          </a:prstGeom>
+          <a:noFill/>
+        </p:spPr>
+        <p:txBody>
+          <a:bodyPr wrap="none" rtlCol="0">
+            <a:spAutoFit/>
+          </a:bodyPr>
+          <a:lstStyle/>
+          <a:p>
+            <a:pPr algn="ctr"/>
+            <a:r>
+              <a:rPr lang="en-CA" dirty="0" smtClean="0"/>
+              <a:t>textual data format specification</a:t>
+            </a:r>
+            <a:endParaRPr lang="en-CA" dirty="0"/>
+          </a:p>
+        </p:txBody>
+      </p:sp>
+      <p:cxnSp>
+        <p:nvCxnSpPr>
+          <p:cNvPr id="21" name="Straight Arrow Connector 20"/>
+          <p:cNvCxnSpPr/>
+          <p:nvPr/>
+        </p:nvCxnSpPr>
+        <p:spPr>
+          <a:xfrm rot="5400000">
+            <a:off x="2033960" y="2060054"/>
+            <a:ext cx="576064" cy="1588"/>
+          </a:xfrm>
+          <a:prstGeom prst="straightConnector1">
+            <a:avLst/>
+          </a:prstGeom>
+          <a:ln>
+            <a:tailEnd type="arrow"/>
+          </a:ln>
+        </p:spPr>
+        <p:style>
+          <a:lnRef idx="1">
+            <a:schemeClr val="accent1"/>
+          </a:lnRef>
+          <a:fillRef idx="0">
+            <a:schemeClr val="accent1"/>
+          </a:fillRef>
+          <a:effectRef idx="0">
+            <a:schemeClr val="accent1"/>
+          </a:effectRef>
+          <a:fontRef idx="minor">
+            <a:schemeClr val="tx1"/>
+          </a:fontRef>
+        </p:style>
+      </p:cxnSp>
+      <p:sp>
+        <p:nvSpPr>
+          <p:cNvPr id="22" name="TextBox 21"/>
+          <p:cNvSpPr txBox="1"/>
+          <p:nvPr/>
+        </p:nvSpPr>
+        <p:spPr>
+          <a:xfrm>
+            <a:off x="2604258" y="2924944"/>
+            <a:ext cx="455574" cy="338554"/>
+          </a:xfrm>
+          <a:prstGeom prst="rect">
+            <a:avLst/>
+          </a:prstGeom>
+          <a:noFill/>
+        </p:spPr>
+        <p:txBody>
+          <a:bodyPr wrap="none" rtlCol="0">
+            <a:spAutoFit/>
+          </a:bodyPr>
+          <a:lstStyle/>
+          <a:p>
+            <a:r>
+              <a:rPr lang="en-CA" sz="1600" dirty="0" smtClean="0">
+                <a:solidFill>
+                  <a:schemeClr val="tx2"/>
+                </a:solidFill>
+              </a:rPr>
+              <a:t>is a</a:t>
+            </a:r>
+            <a:endParaRPr lang="en-CA" sz="1600" dirty="0">
+              <a:solidFill>
+                <a:schemeClr val="tx2"/>
+              </a:solidFill>
+            </a:endParaRPr>
+          </a:p>
+        </p:txBody>
+      </p:sp>
+      <p:cxnSp>
+        <p:nvCxnSpPr>
+          <p:cNvPr id="24" name="Straight Arrow Connector 23"/>
+          <p:cNvCxnSpPr>
+            <a:stCxn id="16" idx="0"/>
+          </p:cNvCxnSpPr>
+          <p:nvPr/>
+        </p:nvCxnSpPr>
+        <p:spPr>
+          <a:xfrm rot="16200000" flipV="1">
+            <a:off x="2957207" y="2209436"/>
+            <a:ext cx="441168" cy="1709928"/>
+          </a:xfrm>
+          <a:prstGeom prst="straightConnector1">
+            <a:avLst/>
+          </a:prstGeom>
+          <a:ln>
+            <a:tailEnd type="arrow"/>
+          </a:ln>
+        </p:spPr>
+        <p:style>
+          <a:lnRef idx="1">
+            <a:schemeClr val="accent1"/>
+          </a:lnRef>
+          <a:fillRef idx="0">
+            <a:schemeClr val="accent1"/>
+          </a:fillRef>
+          <a:effectRef idx="0">
+            <a:schemeClr val="accent1"/>
+          </a:effectRef>
+          <a:fontRef idx="minor">
+            <a:schemeClr val="tx1"/>
+          </a:fontRef>
+        </p:style>
+      </p:cxnSp>
+      <p:sp>
+        <p:nvSpPr>
+          <p:cNvPr id="26" name="TextBox 25"/>
+          <p:cNvSpPr txBox="1"/>
+          <p:nvPr/>
+        </p:nvSpPr>
+        <p:spPr>
+          <a:xfrm>
+            <a:off x="2627784" y="980728"/>
+            <a:ext cx="455574" cy="338554"/>
+          </a:xfrm>
+          <a:prstGeom prst="rect">
+            <a:avLst/>
+          </a:prstGeom>
+          <a:noFill/>
+        </p:spPr>
+        <p:txBody>
+          <a:bodyPr wrap="none" rtlCol="0">
+            <a:spAutoFit/>
+          </a:bodyPr>
+          <a:lstStyle/>
+          <a:p>
+            <a:r>
+              <a:rPr lang="en-CA" sz="1600" dirty="0" smtClean="0">
+                <a:solidFill>
+                  <a:schemeClr val="tx2"/>
+                </a:solidFill>
+              </a:rPr>
+              <a:t>is a</a:t>
+            </a:r>
+            <a:endParaRPr lang="en-CA" sz="1600" dirty="0">
+              <a:solidFill>
+                <a:schemeClr val="tx2"/>
+              </a:solidFill>
+            </a:endParaRPr>
+          </a:p>
+        </p:txBody>
+      </p:sp>
+      <p:cxnSp>
+        <p:nvCxnSpPr>
+          <p:cNvPr id="27" name="Straight Arrow Connector 26"/>
+          <p:cNvCxnSpPr>
+            <a:endCxn id="9" idx="2"/>
+          </p:cNvCxnSpPr>
+          <p:nvPr/>
+        </p:nvCxnSpPr>
+        <p:spPr>
+          <a:xfrm flipV="1">
+            <a:off x="2555776" y="918012"/>
+            <a:ext cx="1475964" cy="494764"/>
+          </a:xfrm>
+          <a:prstGeom prst="straightConnector1">
+            <a:avLst/>
+          </a:prstGeom>
+          <a:ln>
+            <a:tailEnd type="arrow"/>
+          </a:ln>
+        </p:spPr>
+        <p:style>
+          <a:lnRef idx="1">
+            <a:schemeClr val="accent1"/>
+          </a:lnRef>
+          <a:fillRef idx="0">
+            <a:schemeClr val="accent1"/>
+          </a:fillRef>
+          <a:effectRef idx="0">
+            <a:schemeClr val="accent1"/>
+          </a:effectRef>
+          <a:fontRef idx="minor">
+            <a:schemeClr val="tx1"/>
+          </a:fontRef>
+        </p:style>
+      </p:cxnSp>
+    </p:spTree>
+  </p:cSld>
+  <p:clrMapOvr>
+    <a:masterClrMapping/>
+  </p:clrMapOvr>
+</p:sld>
+</file>
+
+<file path=ppt/slides/slide5.xml><?xml version="1.0" encoding="utf-8"?>
+<p:sld xmlns:a="http://schemas.openxmlformats.org/drawingml/2006/main" xmlns:r="http://schemas.openxmlformats.org/officeDocument/2006/relationships" xmlns:p="http://schemas.openxmlformats.org/presentationml/2006/main">
+  <p:cSld>
+    <p:spTree>
+      <p:nvGrpSpPr>
+        <p:cNvPr id="1" name=""/>
+        <p:cNvGrpSpPr/>
+        <p:nvPr/>
+      </p:nvGrpSpPr>
+      <p:grpSpPr>
+        <a:xfrm>
+          <a:off x="0" y="0"/>
+          <a:ext cx="0" cy="0"/>
+          <a:chOff x="0" y="0"/>
+          <a:chExt cx="0" cy="0"/>
+        </a:xfrm>
+      </p:grpSpPr>
+      <p:sp>
+        <p:nvSpPr>
+          <p:cNvPr id="2" name="TextBox 1"/>
+          <p:cNvSpPr txBox="1"/>
+          <p:nvPr/>
+        </p:nvSpPr>
+        <p:spPr>
+          <a:xfrm>
+            <a:off x="2520280" y="2204864"/>
+            <a:ext cx="1070678" cy="1292662"/>
+          </a:xfrm>
+          <a:prstGeom prst="rect">
+            <a:avLst/>
+          </a:prstGeom>
+          <a:noFill/>
+        </p:spPr>
+        <p:txBody>
+          <a:bodyPr wrap="none" rtlCol="0">
+            <a:spAutoFit/>
+          </a:bodyPr>
+          <a:lstStyle/>
+          <a:p>
+            <a:pPr algn="ctr"/>
+            <a:r>
+              <a:rPr lang="en-CA" dirty="0" smtClean="0"/>
+              <a:t>software</a:t>
+            </a:r>
+            <a:br>
+              <a:rPr lang="en-CA" dirty="0" smtClean="0"/>
+            </a:br>
+            <a:r>
+              <a:rPr lang="en-CA" dirty="0" smtClean="0"/>
+              <a:t>module </a:t>
+            </a:r>
+            <a:br>
+              <a:rPr lang="en-CA" dirty="0" smtClean="0"/>
+            </a:br>
+            <a:r>
+              <a:rPr lang="en-CA" sz="1400" i="1" dirty="0" smtClean="0"/>
+              <a:t>to calculate </a:t>
+            </a:r>
+            <a:br>
+              <a:rPr lang="en-CA" sz="1400" i="1" dirty="0" smtClean="0"/>
+            </a:br>
+            <a:r>
+              <a:rPr lang="en-CA" sz="1400" i="1" dirty="0" smtClean="0"/>
+              <a:t>a chemical </a:t>
+            </a:r>
+            <a:br>
+              <a:rPr lang="en-CA" sz="1400" i="1" dirty="0" smtClean="0"/>
+            </a:br>
+            <a:r>
+              <a:rPr lang="en-CA" sz="1400" i="1" dirty="0" smtClean="0"/>
+              <a:t>descriptor</a:t>
+            </a:r>
+            <a:endParaRPr lang="en-CA" dirty="0"/>
+          </a:p>
+        </p:txBody>
+      </p:sp>
+      <p:sp>
+        <p:nvSpPr>
+          <p:cNvPr id="3" name="TextBox 2"/>
+          <p:cNvSpPr txBox="1"/>
+          <p:nvPr/>
+        </p:nvSpPr>
+        <p:spPr>
+          <a:xfrm>
+            <a:off x="2520280" y="548680"/>
+            <a:ext cx="1146468" cy="1015663"/>
+          </a:xfrm>
+          <a:prstGeom prst="rect">
+            <a:avLst/>
+          </a:prstGeom>
+          <a:noFill/>
+        </p:spPr>
+        <p:txBody>
+          <a:bodyPr wrap="none" rtlCol="0">
+            <a:spAutoFit/>
+          </a:bodyPr>
+          <a:lstStyle/>
+          <a:p>
+            <a:pPr algn="ctr"/>
+            <a:r>
+              <a:rPr lang="en-CA" dirty="0" smtClean="0"/>
+              <a:t>algorithm </a:t>
+            </a:r>
+            <a:br>
+              <a:rPr lang="en-CA" dirty="0" smtClean="0"/>
+            </a:br>
+            <a:r>
+              <a:rPr lang="en-CA" sz="1400" i="1" dirty="0" smtClean="0"/>
+              <a:t>to calculate</a:t>
+            </a:r>
+            <a:br>
+              <a:rPr lang="en-CA" sz="1400" i="1" dirty="0" smtClean="0"/>
+            </a:br>
+            <a:r>
+              <a:rPr lang="en-CA" sz="1400" i="1" dirty="0" smtClean="0"/>
+              <a:t>a chemical </a:t>
+            </a:r>
+            <a:br>
+              <a:rPr lang="en-CA" sz="1400" i="1" dirty="0" smtClean="0"/>
+            </a:br>
+            <a:r>
+              <a:rPr lang="en-CA" sz="1400" i="1" dirty="0" smtClean="0"/>
+              <a:t>descriptor</a:t>
+            </a:r>
+            <a:endParaRPr lang="en-CA" dirty="0"/>
+          </a:p>
+        </p:txBody>
+      </p:sp>
+      <p:sp>
+        <p:nvSpPr>
+          <p:cNvPr id="6" name="TextBox 5"/>
+          <p:cNvSpPr txBox="1"/>
+          <p:nvPr/>
+        </p:nvSpPr>
+        <p:spPr>
+          <a:xfrm>
+            <a:off x="1219643" y="467961"/>
+            <a:ext cx="1250663" cy="584775"/>
+          </a:xfrm>
+          <a:prstGeom prst="rect">
+            <a:avLst/>
+          </a:prstGeom>
+          <a:noFill/>
+        </p:spPr>
+        <p:txBody>
+          <a:bodyPr wrap="none" rtlCol="0">
+            <a:spAutoFit/>
+          </a:bodyPr>
+          <a:lstStyle/>
+          <a:p>
+            <a:pPr algn="ctr"/>
+            <a:r>
+              <a:rPr lang="en-CA" sz="1600" i="1" dirty="0" smtClean="0">
+                <a:solidFill>
+                  <a:schemeClr val="tx2"/>
+                </a:solidFill>
+              </a:rPr>
+              <a:t>has specified</a:t>
+            </a:r>
+          </a:p>
+          <a:p>
+            <a:pPr algn="ctr"/>
+            <a:r>
+              <a:rPr lang="en-CA" sz="1600" i="1" dirty="0" smtClean="0">
+                <a:solidFill>
+                  <a:schemeClr val="tx2"/>
+                </a:solidFill>
+              </a:rPr>
+              <a:t> output</a:t>
+            </a:r>
+          </a:p>
+        </p:txBody>
+      </p:sp>
+      <p:cxnSp>
+        <p:nvCxnSpPr>
+          <p:cNvPr id="7" name="Straight Arrow Connector 6"/>
+          <p:cNvCxnSpPr/>
+          <p:nvPr/>
+        </p:nvCxnSpPr>
+        <p:spPr>
+          <a:xfrm rot="16200000" flipV="1">
+            <a:off x="2665090" y="1916038"/>
+            <a:ext cx="720080" cy="1588"/>
+          </a:xfrm>
+          <a:prstGeom prst="straightConnector1">
+            <a:avLst/>
+          </a:prstGeom>
+          <a:ln>
+            <a:tailEnd type="arrow"/>
+          </a:ln>
+        </p:spPr>
+        <p:style>
+          <a:lnRef idx="1">
+            <a:schemeClr val="accent1"/>
+          </a:lnRef>
+          <a:fillRef idx="0">
+            <a:schemeClr val="accent1"/>
+          </a:fillRef>
+          <a:effectRef idx="0">
+            <a:schemeClr val="accent1"/>
+          </a:effectRef>
+          <a:fontRef idx="minor">
+            <a:schemeClr val="tx1"/>
+          </a:fontRef>
+        </p:style>
+      </p:cxnSp>
+      <p:cxnSp>
+        <p:nvCxnSpPr>
+          <p:cNvPr id="8" name="Shape 8"/>
+          <p:cNvCxnSpPr/>
+          <p:nvPr/>
+        </p:nvCxnSpPr>
+        <p:spPr>
+          <a:xfrm rot="10800000">
+            <a:off x="1187624" y="748337"/>
+            <a:ext cx="1224136" cy="1588"/>
+          </a:xfrm>
+          <a:prstGeom prst="bentConnector3">
+            <a:avLst>
+              <a:gd name="adj1" fmla="val 50000"/>
+            </a:avLst>
+          </a:prstGeom>
+          <a:ln>
+            <a:tailEnd type="arrow"/>
+          </a:ln>
+        </p:spPr>
+        <p:style>
+          <a:lnRef idx="1">
+            <a:schemeClr val="accent1"/>
+          </a:lnRef>
+          <a:fillRef idx="0">
+            <a:schemeClr val="accent1"/>
+          </a:fillRef>
+          <a:effectRef idx="0">
+            <a:schemeClr val="accent1"/>
+          </a:effectRef>
+          <a:fontRef idx="minor">
+            <a:schemeClr val="tx1"/>
+          </a:fontRef>
+        </p:style>
+      </p:cxnSp>
+      <p:sp>
+        <p:nvSpPr>
+          <p:cNvPr id="11" name="TextBox 10"/>
+          <p:cNvSpPr txBox="1"/>
+          <p:nvPr/>
+        </p:nvSpPr>
+        <p:spPr>
+          <a:xfrm>
+            <a:off x="2952328" y="1772816"/>
+            <a:ext cx="1190134" cy="338554"/>
+          </a:xfrm>
+          <a:prstGeom prst="rect">
+            <a:avLst/>
+          </a:prstGeom>
+          <a:noFill/>
+        </p:spPr>
+        <p:txBody>
+          <a:bodyPr wrap="none" rtlCol="0">
+            <a:spAutoFit/>
+          </a:bodyPr>
+          <a:lstStyle/>
+          <a:p>
+            <a:r>
+              <a:rPr lang="en-CA" sz="1600" dirty="0" smtClean="0">
+                <a:solidFill>
+                  <a:schemeClr val="tx2"/>
+                </a:solidFill>
+              </a:rPr>
+              <a:t>conforms to</a:t>
+            </a:r>
+            <a:endParaRPr lang="en-CA" sz="1600" dirty="0">
+              <a:solidFill>
+                <a:schemeClr val="tx2"/>
+              </a:solidFill>
+            </a:endParaRPr>
+          </a:p>
+        </p:txBody>
+      </p:sp>
+      <p:sp>
+        <p:nvSpPr>
+          <p:cNvPr id="21" name="TextBox 20"/>
+          <p:cNvSpPr txBox="1"/>
+          <p:nvPr/>
+        </p:nvSpPr>
+        <p:spPr>
+          <a:xfrm>
+            <a:off x="107504" y="449288"/>
+            <a:ext cx="1139992" cy="646331"/>
+          </a:xfrm>
+          <a:prstGeom prst="rect">
+            <a:avLst/>
+          </a:prstGeom>
+          <a:noFill/>
+        </p:spPr>
+        <p:txBody>
+          <a:bodyPr wrap="none" rtlCol="0">
+            <a:spAutoFit/>
+          </a:bodyPr>
+          <a:lstStyle/>
+          <a:p>
+            <a:r>
+              <a:rPr lang="en-CA" dirty="0" smtClean="0"/>
+              <a:t>chemical </a:t>
+            </a:r>
+            <a:br>
+              <a:rPr lang="en-CA" dirty="0" smtClean="0"/>
+            </a:br>
+            <a:r>
+              <a:rPr lang="en-CA" dirty="0" smtClean="0"/>
+              <a:t>descriptor</a:t>
+            </a:r>
+            <a:endParaRPr lang="en-CA" dirty="0"/>
+          </a:p>
+        </p:txBody>
+      </p:sp>
+      <p:cxnSp>
+        <p:nvCxnSpPr>
+          <p:cNvPr id="22" name="Straight Arrow Connector 21"/>
+          <p:cNvCxnSpPr/>
+          <p:nvPr/>
+        </p:nvCxnSpPr>
+        <p:spPr>
+          <a:xfrm>
+            <a:off x="3744416" y="2564904"/>
+            <a:ext cx="1368152" cy="1588"/>
+          </a:xfrm>
+          <a:prstGeom prst="straightConnector1">
+            <a:avLst/>
+          </a:prstGeom>
+          <a:ln>
+            <a:tailEnd type="arrow"/>
+          </a:ln>
+        </p:spPr>
+        <p:style>
+          <a:lnRef idx="1">
+            <a:schemeClr val="accent1"/>
+          </a:lnRef>
+          <a:fillRef idx="0">
+            <a:schemeClr val="accent1"/>
+          </a:fillRef>
+          <a:effectRef idx="0">
+            <a:schemeClr val="accent1"/>
+          </a:effectRef>
+          <a:fontRef idx="minor">
+            <a:schemeClr val="tx1"/>
+          </a:fontRef>
+        </p:style>
+      </p:cxnSp>
+      <p:sp>
+        <p:nvSpPr>
+          <p:cNvPr id="23" name="TextBox 22"/>
+          <p:cNvSpPr txBox="1"/>
+          <p:nvPr/>
+        </p:nvSpPr>
+        <p:spPr>
+          <a:xfrm>
+            <a:off x="5653136" y="1613857"/>
+            <a:ext cx="1250663" cy="584775"/>
+          </a:xfrm>
+          <a:prstGeom prst="rect">
+            <a:avLst/>
+          </a:prstGeom>
+          <a:noFill/>
+        </p:spPr>
+        <p:txBody>
+          <a:bodyPr wrap="none" rtlCol="0">
+            <a:spAutoFit/>
+          </a:bodyPr>
+          <a:lstStyle/>
+          <a:p>
+            <a:pPr algn="ctr"/>
+            <a:r>
+              <a:rPr lang="en-CA" sz="1600" i="1" dirty="0" smtClean="0">
+                <a:solidFill>
+                  <a:schemeClr val="tx2"/>
+                </a:solidFill>
+              </a:rPr>
+              <a:t>has specified</a:t>
+            </a:r>
+          </a:p>
+          <a:p>
+            <a:pPr algn="ctr"/>
+            <a:r>
+              <a:rPr lang="en-CA" sz="1600" i="1" dirty="0" smtClean="0">
+                <a:solidFill>
+                  <a:schemeClr val="tx2"/>
+                </a:solidFill>
+              </a:rPr>
+              <a:t> input</a:t>
+            </a:r>
+          </a:p>
+        </p:txBody>
+      </p:sp>
+      <p:cxnSp>
+        <p:nvCxnSpPr>
+          <p:cNvPr id="24" name="Straight Arrow Connector 23"/>
+          <p:cNvCxnSpPr/>
+          <p:nvPr/>
+        </p:nvCxnSpPr>
+        <p:spPr>
+          <a:xfrm rot="5400000" flipH="1" flipV="1">
+            <a:off x="5292302" y="1901889"/>
+            <a:ext cx="720874" cy="794"/>
+          </a:xfrm>
+          <a:prstGeom prst="straightConnector1">
+            <a:avLst/>
+          </a:prstGeom>
+          <a:ln>
+            <a:tailEnd type="arrow"/>
+          </a:ln>
+        </p:spPr>
+        <p:style>
+          <a:lnRef idx="1">
+            <a:schemeClr val="accent1"/>
+          </a:lnRef>
+          <a:fillRef idx="0">
+            <a:schemeClr val="accent1"/>
+          </a:fillRef>
+          <a:effectRef idx="0">
+            <a:schemeClr val="accent1"/>
+          </a:effectRef>
+          <a:fontRef idx="minor">
+            <a:schemeClr val="tx1"/>
+          </a:fontRef>
+        </p:style>
+      </p:cxnSp>
+      <p:sp>
+        <p:nvSpPr>
+          <p:cNvPr id="25" name="TextBox 24"/>
+          <p:cNvSpPr txBox="1"/>
+          <p:nvPr/>
+        </p:nvSpPr>
+        <p:spPr>
+          <a:xfrm>
+            <a:off x="5112568" y="938401"/>
+            <a:ext cx="1224566" cy="646331"/>
+          </a:xfrm>
+          <a:prstGeom prst="rect">
+            <a:avLst/>
+          </a:prstGeom>
+          <a:noFill/>
+        </p:spPr>
+        <p:txBody>
+          <a:bodyPr wrap="none" rtlCol="0">
+            <a:spAutoFit/>
+          </a:bodyPr>
+          <a:lstStyle/>
+          <a:p>
+            <a:r>
+              <a:rPr lang="en-CA" dirty="0" smtClean="0"/>
+              <a:t>parameter </a:t>
+            </a:r>
+            <a:br>
+              <a:rPr lang="en-CA" dirty="0" smtClean="0"/>
+            </a:br>
+            <a:r>
+              <a:rPr lang="en-CA" dirty="0" smtClean="0"/>
+              <a:t>data item</a:t>
+            </a:r>
+            <a:endParaRPr lang="en-CA" dirty="0"/>
+          </a:p>
+        </p:txBody>
+      </p:sp>
+      <p:sp>
+        <p:nvSpPr>
+          <p:cNvPr id="26" name="TextBox 25"/>
+          <p:cNvSpPr txBox="1"/>
+          <p:nvPr/>
+        </p:nvSpPr>
+        <p:spPr>
+          <a:xfrm>
+            <a:off x="5184576" y="2234545"/>
+            <a:ext cx="1009444" cy="646331"/>
+          </a:xfrm>
+          <a:prstGeom prst="rect">
+            <a:avLst/>
+          </a:prstGeom>
+          <a:noFill/>
+        </p:spPr>
+        <p:txBody>
+          <a:bodyPr wrap="none" rtlCol="0">
+            <a:spAutoFit/>
+          </a:bodyPr>
+          <a:lstStyle/>
+          <a:p>
+            <a:r>
+              <a:rPr lang="en-CA" dirty="0" smtClean="0"/>
+              <a:t>software</a:t>
+            </a:r>
+            <a:br>
+              <a:rPr lang="en-CA" dirty="0" smtClean="0"/>
+            </a:br>
+            <a:r>
+              <a:rPr lang="en-CA" dirty="0" smtClean="0"/>
+              <a:t>method</a:t>
+            </a:r>
+            <a:endParaRPr lang="en-CA" dirty="0"/>
+          </a:p>
+        </p:txBody>
+      </p:sp>
+      <p:sp>
+        <p:nvSpPr>
+          <p:cNvPr id="29" name="TextBox 28"/>
+          <p:cNvSpPr txBox="1"/>
+          <p:nvPr/>
+        </p:nvSpPr>
+        <p:spPr>
+          <a:xfrm>
+            <a:off x="3932769" y="2492896"/>
+            <a:ext cx="873958" cy="338554"/>
+          </a:xfrm>
+          <a:prstGeom prst="rect">
+            <a:avLst/>
+          </a:prstGeom>
+          <a:noFill/>
+        </p:spPr>
+        <p:txBody>
+          <a:bodyPr wrap="none" rtlCol="0">
+            <a:spAutoFit/>
+          </a:bodyPr>
+          <a:lstStyle/>
+          <a:p>
+            <a:pPr algn="ctr"/>
+            <a:r>
+              <a:rPr lang="en-CA" sz="1600" i="1" dirty="0" smtClean="0">
+                <a:solidFill>
+                  <a:schemeClr val="tx2"/>
+                </a:solidFill>
+              </a:rPr>
+              <a:t>has </a:t>
+            </a:r>
+            <a:r>
+              <a:rPr lang="en-CA" sz="1600" i="1" dirty="0" smtClean="0">
+                <a:solidFill>
+                  <a:schemeClr val="tx2"/>
+                </a:solidFill>
+              </a:rPr>
+              <a:t>part</a:t>
+            </a:r>
+            <a:endParaRPr lang="en-CA" sz="1600" i="1" dirty="0" smtClean="0">
+              <a:solidFill>
+                <a:schemeClr val="tx2"/>
+              </a:solidFill>
+            </a:endParaRPr>
+          </a:p>
+        </p:txBody>
+      </p:sp>
+      <p:sp>
+        <p:nvSpPr>
+          <p:cNvPr id="30" name="TextBox 29"/>
+          <p:cNvSpPr txBox="1"/>
+          <p:nvPr/>
+        </p:nvSpPr>
+        <p:spPr>
+          <a:xfrm>
+            <a:off x="4427984" y="2924944"/>
+            <a:ext cx="1250663" cy="584775"/>
+          </a:xfrm>
+          <a:prstGeom prst="rect">
+            <a:avLst/>
+          </a:prstGeom>
+          <a:noFill/>
+        </p:spPr>
+        <p:txBody>
+          <a:bodyPr wrap="none" rtlCol="0">
+            <a:spAutoFit/>
+          </a:bodyPr>
+          <a:lstStyle/>
+          <a:p>
+            <a:pPr algn="ctr"/>
+            <a:r>
+              <a:rPr lang="en-CA" sz="1600" i="1" dirty="0" smtClean="0">
+                <a:solidFill>
+                  <a:schemeClr val="tx2"/>
+                </a:solidFill>
+              </a:rPr>
+              <a:t>has specified</a:t>
+            </a:r>
+          </a:p>
+          <a:p>
+            <a:pPr algn="ctr"/>
+            <a:r>
+              <a:rPr lang="en-CA" sz="1600" i="1" dirty="0" smtClean="0">
+                <a:solidFill>
+                  <a:schemeClr val="tx2"/>
+                </a:solidFill>
+              </a:rPr>
+              <a:t> </a:t>
+            </a:r>
+            <a:r>
+              <a:rPr lang="en-CA" sz="1600" i="1" dirty="0" smtClean="0">
+                <a:solidFill>
+                  <a:schemeClr val="tx2"/>
+                </a:solidFill>
+              </a:rPr>
+              <a:t>output</a:t>
+            </a:r>
+            <a:endParaRPr lang="en-CA" sz="1600" i="1" dirty="0" smtClean="0">
+              <a:solidFill>
+                <a:schemeClr val="tx2"/>
+              </a:solidFill>
+            </a:endParaRPr>
+          </a:p>
+        </p:txBody>
+      </p:sp>
+      <p:cxnSp>
+        <p:nvCxnSpPr>
+          <p:cNvPr id="31" name="Straight Arrow Connector 30"/>
+          <p:cNvCxnSpPr/>
+          <p:nvPr/>
+        </p:nvCxnSpPr>
+        <p:spPr>
+          <a:xfrm rot="5400000">
+            <a:off x="5257775" y="3211785"/>
+            <a:ext cx="719286" cy="1588"/>
+          </a:xfrm>
+          <a:prstGeom prst="straightConnector1">
+            <a:avLst/>
+          </a:prstGeom>
+          <a:ln>
+            <a:tailEnd type="arrow"/>
+          </a:ln>
+        </p:spPr>
+        <p:style>
+          <a:lnRef idx="1">
+            <a:schemeClr val="accent1"/>
+          </a:lnRef>
+          <a:fillRef idx="0">
+            <a:schemeClr val="accent1"/>
+          </a:fillRef>
+          <a:effectRef idx="0">
+            <a:schemeClr val="accent1"/>
+          </a:effectRef>
+          <a:fontRef idx="minor">
+            <a:schemeClr val="tx1"/>
+          </a:fontRef>
+        </p:style>
+      </p:cxnSp>
+      <p:sp>
+        <p:nvSpPr>
+          <p:cNvPr id="32" name="TextBox 31"/>
+          <p:cNvSpPr txBox="1"/>
+          <p:nvPr/>
+        </p:nvSpPr>
+        <p:spPr>
+          <a:xfrm>
+            <a:off x="5112568" y="3502749"/>
+            <a:ext cx="1171667" cy="646331"/>
+          </a:xfrm>
+          <a:prstGeom prst="rect">
+            <a:avLst/>
+          </a:prstGeom>
+          <a:noFill/>
+        </p:spPr>
+        <p:txBody>
+          <a:bodyPr wrap="none" rtlCol="0">
+            <a:spAutoFit/>
+          </a:bodyPr>
+          <a:lstStyle/>
+          <a:p>
+            <a:r>
+              <a:rPr lang="en-CA" dirty="0" smtClean="0"/>
+              <a:t>parameter</a:t>
+            </a:r>
+            <a:br>
+              <a:rPr lang="en-CA" dirty="0" smtClean="0"/>
+            </a:br>
+            <a:r>
+              <a:rPr lang="en-CA" dirty="0" smtClean="0"/>
+              <a:t>data item</a:t>
+            </a:r>
+            <a:endParaRPr lang="en-CA" dirty="0"/>
+          </a:p>
+        </p:txBody>
+      </p:sp>
+      <p:sp>
+        <p:nvSpPr>
+          <p:cNvPr id="34" name="TextBox 33"/>
+          <p:cNvSpPr txBox="1"/>
+          <p:nvPr/>
+        </p:nvSpPr>
+        <p:spPr>
+          <a:xfrm>
+            <a:off x="7380312" y="2348880"/>
+            <a:ext cx="1009444" cy="646331"/>
+          </a:xfrm>
+          <a:prstGeom prst="rect">
+            <a:avLst/>
+          </a:prstGeom>
+          <a:noFill/>
+        </p:spPr>
+        <p:txBody>
+          <a:bodyPr wrap="none" rtlCol="0">
+            <a:spAutoFit/>
+          </a:bodyPr>
+          <a:lstStyle/>
+          <a:p>
+            <a:r>
+              <a:rPr lang="en-CA" dirty="0" smtClean="0"/>
+              <a:t>software</a:t>
+            </a:r>
+            <a:br>
+              <a:rPr lang="en-CA" dirty="0" smtClean="0"/>
+            </a:br>
+            <a:r>
+              <a:rPr lang="en-CA" dirty="0" smtClean="0"/>
+              <a:t>message</a:t>
+            </a:r>
+            <a:endParaRPr lang="en-CA" dirty="0"/>
+          </a:p>
+        </p:txBody>
+      </p:sp>
+      <p:cxnSp>
+        <p:nvCxnSpPr>
+          <p:cNvPr id="35" name="Straight Arrow Connector 34"/>
+          <p:cNvCxnSpPr>
+            <a:stCxn id="26" idx="3"/>
+          </p:cNvCxnSpPr>
+          <p:nvPr/>
+        </p:nvCxnSpPr>
+        <p:spPr>
+          <a:xfrm>
+            <a:off x="6194020" y="2557711"/>
+            <a:ext cx="970268" cy="7193"/>
+          </a:xfrm>
+          <a:prstGeom prst="straightConnector1">
+            <a:avLst/>
+          </a:prstGeom>
+          <a:ln>
+            <a:tailEnd type="arrow"/>
+          </a:ln>
+        </p:spPr>
+        <p:style>
+          <a:lnRef idx="1">
+            <a:schemeClr val="accent1"/>
+          </a:lnRef>
+          <a:fillRef idx="0">
+            <a:schemeClr val="accent1"/>
+          </a:fillRef>
+          <a:effectRef idx="0">
+            <a:schemeClr val="accent1"/>
+          </a:effectRef>
+          <a:fontRef idx="minor">
+            <a:schemeClr val="tx1"/>
+          </a:fontRef>
+        </p:style>
+      </p:cxnSp>
+      <p:sp>
+        <p:nvSpPr>
+          <p:cNvPr id="38" name="TextBox 37"/>
+          <p:cNvSpPr txBox="1"/>
+          <p:nvPr/>
+        </p:nvSpPr>
+        <p:spPr>
+          <a:xfrm>
+            <a:off x="6732240" y="3284984"/>
+            <a:ext cx="997068" cy="646331"/>
+          </a:xfrm>
+          <a:prstGeom prst="rect">
+            <a:avLst/>
+          </a:prstGeom>
+          <a:noFill/>
+        </p:spPr>
+        <p:txBody>
+          <a:bodyPr wrap="none" rtlCol="0">
+            <a:spAutoFit/>
+          </a:bodyPr>
+          <a:lstStyle/>
+          <a:p>
+            <a:r>
+              <a:rPr lang="en-CA" dirty="0" smtClean="0"/>
+              <a:t>error </a:t>
+            </a:r>
+            <a:br>
+              <a:rPr lang="en-CA" dirty="0" smtClean="0"/>
+            </a:br>
+            <a:r>
+              <a:rPr lang="en-CA" dirty="0" smtClean="0"/>
+              <a:t>message</a:t>
+            </a:r>
+            <a:endParaRPr lang="en-CA" dirty="0"/>
+          </a:p>
+        </p:txBody>
+      </p:sp>
+      <p:sp>
+        <p:nvSpPr>
+          <p:cNvPr id="39" name="TextBox 38"/>
+          <p:cNvSpPr txBox="1"/>
+          <p:nvPr/>
+        </p:nvSpPr>
+        <p:spPr>
+          <a:xfrm>
+            <a:off x="7873324" y="3284984"/>
+            <a:ext cx="997068" cy="646331"/>
+          </a:xfrm>
+          <a:prstGeom prst="rect">
+            <a:avLst/>
+          </a:prstGeom>
+          <a:noFill/>
+        </p:spPr>
+        <p:txBody>
+          <a:bodyPr wrap="none" rtlCol="0">
+            <a:spAutoFit/>
+          </a:bodyPr>
+          <a:lstStyle/>
+          <a:p>
+            <a:r>
+              <a:rPr lang="en-CA" dirty="0" smtClean="0"/>
+              <a:t>warning </a:t>
+            </a:r>
+            <a:br>
+              <a:rPr lang="en-CA" dirty="0" smtClean="0"/>
+            </a:br>
+            <a:r>
+              <a:rPr lang="en-CA" dirty="0" smtClean="0"/>
+              <a:t>message</a:t>
+            </a:r>
+            <a:endParaRPr lang="en-CA" dirty="0"/>
+          </a:p>
+        </p:txBody>
+      </p:sp>
+      <p:cxnSp>
+        <p:nvCxnSpPr>
+          <p:cNvPr id="40" name="Straight Arrow Connector 39"/>
+          <p:cNvCxnSpPr>
+            <a:stCxn id="38" idx="0"/>
+            <a:endCxn id="34" idx="2"/>
+          </p:cNvCxnSpPr>
+          <p:nvPr/>
+        </p:nvCxnSpPr>
+        <p:spPr>
+          <a:xfrm rot="5400000" flipH="1" flipV="1">
+            <a:off x="7413018" y="2812968"/>
+            <a:ext cx="289773" cy="654260"/>
+          </a:xfrm>
+          <a:prstGeom prst="straightConnector1">
+            <a:avLst/>
+          </a:prstGeom>
+          <a:ln>
+            <a:tailEnd type="arrow"/>
+          </a:ln>
+        </p:spPr>
+        <p:style>
+          <a:lnRef idx="1">
+            <a:schemeClr val="accent1"/>
+          </a:lnRef>
+          <a:fillRef idx="0">
+            <a:schemeClr val="accent1"/>
+          </a:fillRef>
+          <a:effectRef idx="0">
+            <a:schemeClr val="accent1"/>
+          </a:effectRef>
+          <a:fontRef idx="minor">
+            <a:schemeClr val="tx1"/>
+          </a:fontRef>
+        </p:style>
+      </p:cxnSp>
+      <p:cxnSp>
+        <p:nvCxnSpPr>
+          <p:cNvPr id="45" name="Straight Arrow Connector 44"/>
+          <p:cNvCxnSpPr>
+            <a:stCxn id="39" idx="0"/>
+            <a:endCxn id="34" idx="2"/>
+          </p:cNvCxnSpPr>
+          <p:nvPr/>
+        </p:nvCxnSpPr>
+        <p:spPr>
+          <a:xfrm rot="16200000" flipV="1">
+            <a:off x="7983560" y="2896686"/>
+            <a:ext cx="289773" cy="486824"/>
+          </a:xfrm>
+          <a:prstGeom prst="straightConnector1">
+            <a:avLst/>
+          </a:prstGeom>
+          <a:ln>
+            <a:tailEnd type="arrow"/>
+          </a:ln>
+        </p:spPr>
+        <p:style>
+          <a:lnRef idx="1">
+            <a:schemeClr val="accent1"/>
+          </a:lnRef>
+          <a:fillRef idx="0">
+            <a:schemeClr val="accent1"/>
+          </a:fillRef>
+          <a:effectRef idx="0">
+            <a:schemeClr val="accent1"/>
+          </a:effectRef>
+          <a:fontRef idx="minor">
+            <a:schemeClr val="tx1"/>
+          </a:fontRef>
+        </p:style>
+      </p:cxnSp>
+      <p:sp>
+        <p:nvSpPr>
+          <p:cNvPr id="48" name="TextBox 47"/>
+          <p:cNvSpPr txBox="1"/>
+          <p:nvPr/>
+        </p:nvSpPr>
+        <p:spPr>
+          <a:xfrm>
+            <a:off x="7596336" y="2996952"/>
+            <a:ext cx="463588" cy="338554"/>
+          </a:xfrm>
+          <a:prstGeom prst="rect">
+            <a:avLst/>
+          </a:prstGeom>
+          <a:noFill/>
+        </p:spPr>
+        <p:txBody>
+          <a:bodyPr wrap="none" rtlCol="0">
+            <a:spAutoFit/>
+          </a:bodyPr>
+          <a:lstStyle/>
+          <a:p>
+            <a:pPr algn="ctr"/>
+            <a:r>
+              <a:rPr lang="en-CA" sz="1600" i="1" dirty="0" smtClean="0">
+                <a:solidFill>
+                  <a:schemeClr val="tx2"/>
+                </a:solidFill>
+              </a:rPr>
+              <a:t>is a</a:t>
+            </a:r>
+            <a:endParaRPr lang="en-CA" sz="1600" i="1" dirty="0" smtClean="0">
+              <a:solidFill>
+                <a:schemeClr val="tx2"/>
+              </a:solidFill>
+            </a:endParaRPr>
+          </a:p>
+        </p:txBody>
+      </p:sp>
+      <p:sp>
+        <p:nvSpPr>
+          <p:cNvPr id="50" name="TextBox 49"/>
+          <p:cNvSpPr txBox="1"/>
+          <p:nvPr/>
+        </p:nvSpPr>
+        <p:spPr>
+          <a:xfrm>
+            <a:off x="6084168" y="2276872"/>
+            <a:ext cx="1250663" cy="584775"/>
+          </a:xfrm>
+          <a:prstGeom prst="rect">
+            <a:avLst/>
+          </a:prstGeom>
+          <a:noFill/>
+        </p:spPr>
+        <p:txBody>
+          <a:bodyPr wrap="none" rtlCol="0">
+            <a:spAutoFit/>
+          </a:bodyPr>
+          <a:lstStyle/>
+          <a:p>
+            <a:pPr algn="ctr"/>
+            <a:r>
+              <a:rPr lang="en-CA" sz="1600" i="1" dirty="0" smtClean="0">
+                <a:solidFill>
+                  <a:schemeClr val="tx2"/>
+                </a:solidFill>
+              </a:rPr>
+              <a:t>has specified</a:t>
+            </a:r>
+          </a:p>
+          <a:p>
+            <a:pPr algn="ctr"/>
+            <a:r>
+              <a:rPr lang="en-CA" sz="1600" i="1" dirty="0" smtClean="0">
+                <a:solidFill>
+                  <a:schemeClr val="tx2"/>
+                </a:solidFill>
+              </a:rPr>
+              <a:t> </a:t>
+            </a:r>
+            <a:r>
+              <a:rPr lang="en-CA" sz="1600" i="1" dirty="0" smtClean="0">
+                <a:solidFill>
+                  <a:schemeClr val="tx2"/>
+                </a:solidFill>
+              </a:rPr>
+              <a:t>output</a:t>
+            </a:r>
+            <a:endParaRPr lang="en-CA" sz="1600" i="1" dirty="0" smtClean="0">
+              <a:solidFill>
+                <a:schemeClr val="tx2"/>
+              </a:solidFill>
+            </a:endParaRPr>
+          </a:p>
+        </p:txBody>
+      </p:sp>
+    </p:spTree>
+  </p:cSld>
+  <p:clrMapOvr>
+    <a:masterClrMapping/>
+  </p:clrMapOvr>
+</p:sld>
+</file>
+
+<file path=ppt/slides/slide6.xml><?xml version="1.0" encoding="utf-8"?>
+<p:sld xmlns:a="http://schemas.openxmlformats.org/drawingml/2006/main" xmlns:r="http://schemas.openxmlformats.org/officeDocument/2006/relationships" xmlns:p="http://schemas.openxmlformats.org/presentationml/2006/main">
+  <p:cSld>
+    <p:spTree>
+      <p:nvGrpSpPr>
+        <p:cNvPr id="1" name=""/>
+        <p:cNvGrpSpPr/>
+        <p:nvPr/>
+      </p:nvGrpSpPr>
+      <p:grpSpPr>
+        <a:xfrm>
+          <a:off x="0" y="0"/>
+          <a:ext cx="0" cy="0"/>
+          <a:chOff x="0" y="0"/>
+          <a:chExt cx="0" cy="0"/>
+        </a:xfrm>
+      </p:grpSpPr>
+      <p:pic>
+        <p:nvPicPr>
+          <p:cNvPr id="1029" name="Picture 5"/>
+          <p:cNvPicPr>
+            <a:picLocks noChangeAspect="1" noChangeArrowheads="1"/>
+          </p:cNvPicPr>
+          <p:nvPr/>
+        </p:nvPicPr>
+        <p:blipFill>
+          <a:blip r:embed="rId2" cstate="print"/>
+          <a:srcRect l="9277" t="26837" r="51625" b="42432"/>
+          <a:stretch>
+            <a:fillRect/>
+          </a:stretch>
+        </p:blipFill>
+        <p:spPr bwMode="auto">
+          <a:xfrm>
+            <a:off x="467544" y="476672"/>
+            <a:ext cx="4137434" cy="2435382"/>
+          </a:xfrm>
+          <a:prstGeom prst="rect">
+            <a:avLst/>
+          </a:prstGeom>
+          <a:noFill/>
+          <a:ln w="9525">
+            <a:noFill/>
+            <a:miter lim="800000"/>
+            <a:headEnd/>
+            <a:tailEnd/>
+          </a:ln>
+        </p:spPr>
+      </p:pic>
+      <p:pic>
+        <p:nvPicPr>
+          <p:cNvPr id="1030" name="Picture 6"/>
+          <p:cNvPicPr>
+            <a:picLocks noChangeAspect="1" noChangeArrowheads="1"/>
+          </p:cNvPicPr>
+          <p:nvPr/>
+        </p:nvPicPr>
+        <p:blipFill>
+          <a:blip r:embed="rId2" cstate="print"/>
+          <a:srcRect l="52481" t="48315" r="3887" b="44830"/>
+          <a:stretch>
+            <a:fillRect/>
+          </a:stretch>
+        </p:blipFill>
+        <p:spPr bwMode="auto">
+          <a:xfrm>
+            <a:off x="4067944" y="980728"/>
+            <a:ext cx="4617268" cy="543208"/>
+          </a:xfrm>
+          <a:prstGeom prst="rect">
+            <a:avLst/>
+          </a:prstGeom>
+          <a:noFill/>
+          <a:ln w="9525">
+            <a:noFill/>
+            <a:miter lim="800000"/>
+            <a:headEnd/>
+            <a:tailEnd/>
+          </a:ln>
+        </p:spPr>
+      </p:pic>
+      <p:sp>
+        <p:nvSpPr>
+          <p:cNvPr id="7" name="Right Arrow 6"/>
+          <p:cNvSpPr/>
+          <p:nvPr/>
+        </p:nvSpPr>
+        <p:spPr>
+          <a:xfrm>
+            <a:off x="3635896" y="980728"/>
+            <a:ext cx="360040" cy="504056"/>
+          </a:xfrm>
+          <a:prstGeom prst="rightArrow">
+            <a:avLst/>
+          </a:prstGeom>
+        </p:spPr>
+        <p:style>
+          <a:lnRef idx="2">
+            <a:schemeClr val="accent1">
+              <a:shade val="50000"/>
+            </a:schemeClr>
+          </a:lnRef>
+          <a:fillRef idx="1">
+            <a:schemeClr val="accent1"/>
+          </a:fillRef>
+          <a:effectRef idx="0">
+            <a:schemeClr val="accent1"/>
+          </a:effectRef>
+          <a:fontRef idx="minor">
+            <a:schemeClr val="lt1"/>
+          </a:fontRef>
+        </p:style>
+        <p:txBody>
+          <a:bodyPr rtlCol="0" anchor="ctr"/>
+          <a:lstStyle/>
+          <a:p>
+            <a:pPr algn="ctr"/>
+            <a:endParaRPr lang="en-GB"/>
+          </a:p>
+        </p:txBody>
+      </p:sp>
+      <p:sp>
+        <p:nvSpPr>
+          <p:cNvPr id="8" name="Down Arrow 7"/>
+          <p:cNvSpPr/>
+          <p:nvPr/>
+        </p:nvSpPr>
+        <p:spPr>
+          <a:xfrm>
+            <a:off x="5364088" y="1628800"/>
+            <a:ext cx="864096" cy="504056"/>
+          </a:xfrm>
+          <a:prstGeom prst="downArrow">
+            <a:avLst/>
+          </a:prstGeom>
+        </p:spPr>
+        <p:style>
+          <a:lnRef idx="2">
+            <a:schemeClr val="accent1">
+              <a:shade val="50000"/>
+            </a:schemeClr>
+          </a:lnRef>
+          <a:fillRef idx="1">
+            <a:schemeClr val="accent1"/>
+          </a:fillRef>
+          <a:effectRef idx="0">
+            <a:schemeClr val="accent1"/>
+          </a:effectRef>
+          <a:fontRef idx="minor">
+            <a:schemeClr val="lt1"/>
+          </a:fontRef>
+        </p:style>
+        <p:txBody>
+          <a:bodyPr rtlCol="0" anchor="ctr"/>
+          <a:lstStyle/>
+          <a:p>
+            <a:pPr algn="ctr"/>
+            <a:endParaRPr lang="en-GB"/>
+          </a:p>
+        </p:txBody>
+      </p:sp>
+      <p:sp>
+        <p:nvSpPr>
+          <p:cNvPr id="9" name="TextBox 8"/>
+          <p:cNvSpPr txBox="1"/>
+          <p:nvPr/>
+        </p:nvSpPr>
+        <p:spPr>
+          <a:xfrm>
+            <a:off x="6328175" y="1412776"/>
+            <a:ext cx="1700209" cy="923330"/>
+          </a:xfrm>
+          <a:prstGeom prst="rect">
+            <a:avLst/>
+          </a:prstGeom>
+          <a:noFill/>
+        </p:spPr>
+        <p:txBody>
+          <a:bodyPr wrap="none" rtlCol="0">
+            <a:spAutoFit/>
+          </a:bodyPr>
+          <a:lstStyle/>
+          <a:p>
+            <a:r>
+              <a:rPr lang="en-GB" dirty="0" smtClean="0"/>
+              <a:t>after executing</a:t>
+            </a:r>
+            <a:br>
+              <a:rPr lang="en-GB" dirty="0" smtClean="0"/>
+            </a:br>
+            <a:r>
+              <a:rPr lang="en-GB" dirty="0" smtClean="0"/>
+              <a:t>a </a:t>
+            </a:r>
+            <a:r>
+              <a:rPr lang="en-GB" dirty="0" err="1" smtClean="0"/>
+              <a:t>reasoner</a:t>
+            </a:r>
+            <a:r>
+              <a:rPr lang="en-GB" dirty="0" smtClean="0"/>
+              <a:t/>
+            </a:r>
+            <a:br>
+              <a:rPr lang="en-GB" dirty="0" smtClean="0"/>
+            </a:br>
+            <a:r>
+              <a:rPr lang="en-GB" dirty="0" smtClean="0"/>
+              <a:t>for classification</a:t>
+            </a:r>
+            <a:endParaRPr lang="en-GB" dirty="0"/>
+          </a:p>
+        </p:txBody>
+      </p:sp>
+      <p:pic>
+        <p:nvPicPr>
+          <p:cNvPr id="1031" name="Picture 7"/>
+          <p:cNvPicPr>
+            <a:picLocks noChangeAspect="1" noChangeArrowheads="1"/>
+          </p:cNvPicPr>
+          <p:nvPr/>
+        </p:nvPicPr>
+        <p:blipFill>
+          <a:blip r:embed="rId3" cstate="print"/>
+          <a:srcRect l="9172" t="34553" r="53403" b="49091"/>
+          <a:stretch>
+            <a:fillRect/>
+          </a:stretch>
+        </p:blipFill>
+        <p:spPr bwMode="auto">
+          <a:xfrm>
+            <a:off x="4355976" y="2420888"/>
+            <a:ext cx="3960440" cy="1296144"/>
+          </a:xfrm>
+          <a:prstGeom prst="rect">
+            <a:avLst/>
+          </a:prstGeom>
+          <a:noFill/>
+          <a:ln w="9525">
+            <a:noFill/>
+            <a:miter lim="800000"/>
+            <a:headEnd/>
+            <a:tailEnd/>
+          </a:ln>
+        </p:spPr>
+      </p:pic>
     </p:spTree>
   </p:cSld>
   <p:clrMapOvr>

</xml_diff>

<commit_message>
this seems to have been updated a bit
</commit_message>
<xml_diff>
--- a/documentation/images/diagrams.pptx
+++ b/documentation/images/diagrams.pptx
@@ -294,7 +294,7 @@
             <a:fld id="{9222C97E-73C8-43E8-A42B-6C809C4F9F15}" type="datetimeFigureOut">
               <a:rPr lang="en-US" smtClean="0"/>
               <a:pPr/>
-              <a:t>11/15/2010</a:t>
+              <a:t>5/27/2011</a:t>
             </a:fld>
             <a:endParaRPr lang="en-CA"/>
           </a:p>
@@ -461,7 +461,7 @@
             <a:fld id="{9222C97E-73C8-43E8-A42B-6C809C4F9F15}" type="datetimeFigureOut">
               <a:rPr lang="en-US" smtClean="0"/>
               <a:pPr/>
-              <a:t>11/15/2010</a:t>
+              <a:t>5/27/2011</a:t>
             </a:fld>
             <a:endParaRPr lang="en-CA"/>
           </a:p>
@@ -638,7 +638,7 @@
             <a:fld id="{9222C97E-73C8-43E8-A42B-6C809C4F9F15}" type="datetimeFigureOut">
               <a:rPr lang="en-US" smtClean="0"/>
               <a:pPr/>
-              <a:t>11/15/2010</a:t>
+              <a:t>5/27/2011</a:t>
             </a:fld>
             <a:endParaRPr lang="en-CA"/>
           </a:p>
@@ -805,7 +805,7 @@
             <a:fld id="{9222C97E-73C8-43E8-A42B-6C809C4F9F15}" type="datetimeFigureOut">
               <a:rPr lang="en-US" smtClean="0"/>
               <a:pPr/>
-              <a:t>11/15/2010</a:t>
+              <a:t>5/27/2011</a:t>
             </a:fld>
             <a:endParaRPr lang="en-CA"/>
           </a:p>
@@ -1048,7 +1048,7 @@
             <a:fld id="{9222C97E-73C8-43E8-A42B-6C809C4F9F15}" type="datetimeFigureOut">
               <a:rPr lang="en-US" smtClean="0"/>
               <a:pPr/>
-              <a:t>11/15/2010</a:t>
+              <a:t>5/27/2011</a:t>
             </a:fld>
             <a:endParaRPr lang="en-CA"/>
           </a:p>
@@ -1333,7 +1333,7 @@
             <a:fld id="{9222C97E-73C8-43E8-A42B-6C809C4F9F15}" type="datetimeFigureOut">
               <a:rPr lang="en-US" smtClean="0"/>
               <a:pPr/>
-              <a:t>11/15/2010</a:t>
+              <a:t>5/27/2011</a:t>
             </a:fld>
             <a:endParaRPr lang="en-CA"/>
           </a:p>
@@ -1752,7 +1752,7 @@
             <a:fld id="{9222C97E-73C8-43E8-A42B-6C809C4F9F15}" type="datetimeFigureOut">
               <a:rPr lang="en-US" smtClean="0"/>
               <a:pPr/>
-              <a:t>11/15/2010</a:t>
+              <a:t>5/27/2011</a:t>
             </a:fld>
             <a:endParaRPr lang="en-CA"/>
           </a:p>
@@ -1867,7 +1867,7 @@
             <a:fld id="{9222C97E-73C8-43E8-A42B-6C809C4F9F15}" type="datetimeFigureOut">
               <a:rPr lang="en-US" smtClean="0"/>
               <a:pPr/>
-              <a:t>11/15/2010</a:t>
+              <a:t>5/27/2011</a:t>
             </a:fld>
             <a:endParaRPr lang="en-CA"/>
           </a:p>
@@ -1959,7 +1959,7 @@
             <a:fld id="{9222C97E-73C8-43E8-A42B-6C809C4F9F15}" type="datetimeFigureOut">
               <a:rPr lang="en-US" smtClean="0"/>
               <a:pPr/>
-              <a:t>11/15/2010</a:t>
+              <a:t>5/27/2011</a:t>
             </a:fld>
             <a:endParaRPr lang="en-CA"/>
           </a:p>
@@ -2233,7 +2233,7 @@
             <a:fld id="{9222C97E-73C8-43E8-A42B-6C809C4F9F15}" type="datetimeFigureOut">
               <a:rPr lang="en-US" smtClean="0"/>
               <a:pPr/>
-              <a:t>11/15/2010</a:t>
+              <a:t>5/27/2011</a:t>
             </a:fld>
             <a:endParaRPr lang="en-CA"/>
           </a:p>
@@ -2483,7 +2483,7 @@
             <a:fld id="{9222C97E-73C8-43E8-A42B-6C809C4F9F15}" type="datetimeFigureOut">
               <a:rPr lang="en-US" smtClean="0"/>
               <a:pPr/>
-              <a:t>11/15/2010</a:t>
+              <a:t>5/27/2011</a:t>
             </a:fld>
             <a:endParaRPr lang="en-CA"/>
           </a:p>
@@ -2693,7 +2693,7 @@
             <a:fld id="{9222C97E-73C8-43E8-A42B-6C809C4F9F15}" type="datetimeFigureOut">
               <a:rPr lang="en-US" smtClean="0"/>
               <a:pPr/>
-              <a:t>11/15/2010</a:t>
+              <a:t>5/27/2011</a:t>
             </a:fld>
             <a:endParaRPr lang="en-CA"/>
           </a:p>
@@ -3395,7 +3395,23 @@
                   <a:schemeClr val="tx2"/>
                 </a:solidFill>
               </a:rPr>
-              <a:t>is descriptor of</a:t>
+              <a:t>is </a:t>
+            </a:r>
+            <a:r>
+              <a:rPr lang="en-CA" sz="1600" dirty="0" smtClean="0">
+                <a:solidFill>
+                  <a:schemeClr val="tx2"/>
+                </a:solidFill>
+              </a:rPr>
+              <a:t>descriptor </a:t>
+            </a:r>
+            <a:r>
+              <a:rPr lang="en-CA" sz="1600" dirty="0" smtClean="0">
+                <a:solidFill>
+                  <a:schemeClr val="tx2"/>
+                </a:solidFill>
+              </a:rPr>
+              <a:t>of</a:t>
             </a:r>
             <a:endParaRPr lang="en-CA" sz="1600" dirty="0">
               <a:solidFill>
@@ -5775,20 +5791,12 @@
               <a:rPr lang="en-CA" dirty="0" smtClean="0"/>
               <a:t>numeric </a:t>
             </a:r>
-            <a:r>
-              <a:rPr lang="en-CA" dirty="0" smtClean="0"/>
-              <a:t/>
-            </a:r>
             <a:br>
               <a:rPr lang="en-CA" dirty="0" smtClean="0"/>
             </a:br>
             <a:r>
               <a:rPr lang="en-CA" dirty="0" smtClean="0"/>
-              <a:t>data </a:t>
-            </a:r>
-            <a:r>
-              <a:rPr lang="en-CA" dirty="0" smtClean="0"/>
-              <a:t>format specification</a:t>
+              <a:t>data format specification</a:t>
             </a:r>
             <a:endParaRPr lang="en-CA" dirty="0"/>
           </a:p>
@@ -6134,10 +6142,6 @@
             <a:r>
               <a:rPr lang="en-CA" dirty="0" smtClean="0"/>
               <a:t>textual </a:t>
-            </a:r>
-            <a:r>
-              <a:rPr lang="en-CA" dirty="0" smtClean="0"/>
-              <a:t/>
             </a:r>
             <a:br>
               <a:rPr lang="en-CA" dirty="0" smtClean="0"/>
@@ -7318,11 +7322,7 @@
           <a:p>
             <a:r>
               <a:rPr lang="en-CA" dirty="0" smtClean="0"/>
-              <a:t>data </a:t>
-            </a:r>
-            <a:r>
-              <a:rPr lang="en-CA" dirty="0" smtClean="0"/>
-              <a:t>item</a:t>
+              <a:t>data item</a:t>
             </a:r>
             <a:endParaRPr lang="en-CA" dirty="0"/>
           </a:p>

</xml_diff>